<commit_message>
first major update for 2026 class
</commit_message>
<xml_diff>
--- a/assets/Slide backup class 3.pptx
+++ b/assets/Slide backup class 3.pptx
@@ -5,20 +5,24 @@
     <p:sldMasterId id="2147483648" r:id="rId1"/>
   </p:sldMasterIdLst>
   <p:notesMasterIdLst>
-    <p:notesMasterId r:id="rId5"/>
+    <p:notesMasterId r:id="rId9"/>
   </p:notesMasterIdLst>
   <p:handoutMasterIdLst>
-    <p:handoutMasterId r:id="rId6"/>
+    <p:handoutMasterId r:id="rId10"/>
   </p:handoutMasterIdLst>
   <p:sldIdLst>
     <p:sldId id="965" r:id="rId2"/>
     <p:sldId id="919" r:id="rId3"/>
     <p:sldId id="966" r:id="rId4"/>
+    <p:sldId id="267" r:id="rId5"/>
+    <p:sldId id="272" r:id="rId6"/>
+    <p:sldId id="273" r:id="rId7"/>
+    <p:sldId id="274" r:id="rId8"/>
   </p:sldIdLst>
   <p:sldSz cx="9144000" cy="6858000" type="screen4x3"/>
   <p:notesSz cx="7315200" cy="9601200"/>
   <p:custDataLst>
-    <p:tags r:id="rId7"/>
+    <p:tags r:id="rId11"/>
   </p:custDataLst>
   <p:defaultTextStyle>
     <a:defPPr>
@@ -123,6 +127,10 @@
             <p14:sldId id="965"/>
             <p14:sldId id="919"/>
             <p14:sldId id="966"/>
+            <p14:sldId id="267"/>
+            <p14:sldId id="272"/>
+            <p14:sldId id="273"/>
+            <p14:sldId id="274"/>
           </p14:sldIdLst>
         </p14:section>
       </p14:sectionLst>
@@ -252,7 +260,7 @@
           <a:p>
             <a:fld id="{1922B18C-0895-40C2-A98C-6A22ECA7D214}" type="datetimeFigureOut">
               <a:rPr lang="en-US" smtClean="0"/>
-              <a:t>2/13/24</a:t>
+              <a:t>11/17/25</a:t>
             </a:fld>
             <a:endParaRPr lang="en-US"/>
           </a:p>
@@ -417,7 +425,7 @@
           <a:p>
             <a:fld id="{7CEB82EE-7859-43C3-BD1F-7B4F0DAB0F46}" type="datetimeFigureOut">
               <a:rPr lang="en-US" smtClean="0"/>
-              <a:t>2/13/24</a:t>
+              <a:t>11/17/25</a:t>
             </a:fld>
             <a:endParaRPr lang="en-US" dirty="0"/>
           </a:p>
@@ -2053,6 +2061,209 @@
 </p:sldLayout>
 </file>
 
+<file path=ppt/slideLayouts/slideLayout4.xml><?xml version="1.0" encoding="utf-8"?>
+<p:sldLayout xmlns:a="http://schemas.openxmlformats.org/drawingml/2006/main" xmlns:r="http://schemas.openxmlformats.org/officeDocument/2006/relationships" xmlns:p="http://schemas.openxmlformats.org/presentationml/2006/main" type="obj">
+  <p:cSld name="Title and Content">
+    <p:spTree>
+      <p:nvGrpSpPr>
+        <p:cNvPr id="1" name=""/>
+        <p:cNvGrpSpPr/>
+        <p:nvPr/>
+      </p:nvGrpSpPr>
+      <p:grpSpPr>
+        <a:xfrm>
+          <a:off x="0" y="0"/>
+          <a:ext cx="0" cy="0"/>
+          <a:chOff x="0" y="0"/>
+          <a:chExt cx="0" cy="0"/>
+        </a:xfrm>
+      </p:grpSpPr>
+      <p:sp>
+        <p:nvSpPr>
+          <p:cNvPr id="2" name="Title 1">
+            <a:extLst>
+              <a:ext uri="{FF2B5EF4-FFF2-40B4-BE49-F238E27FC236}">
+                <a16:creationId xmlns:a16="http://schemas.microsoft.com/office/drawing/2014/main" id="{65F71563-4657-434B-B332-C9AD0F3BE19A}"/>
+              </a:ext>
+            </a:extLst>
+          </p:cNvPr>
+          <p:cNvSpPr>
+            <a:spLocks noGrp="1"/>
+          </p:cNvSpPr>
+          <p:nvPr>
+            <p:ph type="title"/>
+          </p:nvPr>
+        </p:nvSpPr>
+        <p:spPr/>
+        <p:txBody>
+          <a:bodyPr/>
+          <a:lstStyle/>
+          <a:p>
+            <a:r>
+              <a:rPr lang="en-US"/>
+              <a:t>Click to edit Master title style</a:t>
+            </a:r>
+          </a:p>
+        </p:txBody>
+      </p:sp>
+      <p:sp>
+        <p:nvSpPr>
+          <p:cNvPr id="3" name="Content Placeholder 2">
+            <a:extLst>
+              <a:ext uri="{FF2B5EF4-FFF2-40B4-BE49-F238E27FC236}">
+                <a16:creationId xmlns:a16="http://schemas.microsoft.com/office/drawing/2014/main" id="{7EA8A9E3-6209-3A43-8AD9-E82D9F96B101}"/>
+              </a:ext>
+            </a:extLst>
+          </p:cNvPr>
+          <p:cNvSpPr>
+            <a:spLocks noGrp="1"/>
+          </p:cNvSpPr>
+          <p:nvPr>
+            <p:ph idx="1"/>
+          </p:nvPr>
+        </p:nvSpPr>
+        <p:spPr>
+          <a:xfrm>
+            <a:off x="134860" y="908720"/>
+            <a:ext cx="4042792" cy="1077218"/>
+          </a:xfrm>
+        </p:spPr>
+        <p:txBody>
+          <a:bodyPr/>
+          <a:lstStyle/>
+          <a:p>
+            <a:pPr lvl="0"/>
+            <a:r>
+              <a:rPr lang="en-US"/>
+              <a:t>Click to edit Master text styles</a:t>
+            </a:r>
+          </a:p>
+          <a:p>
+            <a:pPr lvl="1"/>
+            <a:r>
+              <a:rPr lang="en-US"/>
+              <a:t>Second level</a:t>
+            </a:r>
+          </a:p>
+          <a:p>
+            <a:pPr lvl="2"/>
+            <a:r>
+              <a:rPr lang="en-US"/>
+              <a:t>Third level</a:t>
+            </a:r>
+          </a:p>
+          <a:p>
+            <a:pPr lvl="3"/>
+            <a:r>
+              <a:rPr lang="en-US"/>
+              <a:t>Fourth level</a:t>
+            </a:r>
+          </a:p>
+          <a:p>
+            <a:pPr lvl="4"/>
+            <a:r>
+              <a:rPr lang="en-US"/>
+              <a:t>Fifth level</a:t>
+            </a:r>
+          </a:p>
+        </p:txBody>
+      </p:sp>
+      <p:sp>
+        <p:nvSpPr>
+          <p:cNvPr id="4" name="Date Placeholder 3">
+            <a:extLst>
+              <a:ext uri="{FF2B5EF4-FFF2-40B4-BE49-F238E27FC236}">
+                <a16:creationId xmlns:a16="http://schemas.microsoft.com/office/drawing/2014/main" id="{57BD8692-2B3C-B04B-931D-7292B96BF0EA}"/>
+              </a:ext>
+            </a:extLst>
+          </p:cNvPr>
+          <p:cNvSpPr>
+            <a:spLocks noGrp="1"/>
+          </p:cNvSpPr>
+          <p:nvPr>
+            <p:ph type="dt" sz="half" idx="10"/>
+          </p:nvPr>
+        </p:nvSpPr>
+        <p:spPr/>
+        <p:txBody>
+          <a:bodyPr/>
+          <a:lstStyle/>
+          <a:p>
+            <a:fld id="{E86A0111-1702-E047-A1C8-69663819CF6C}" type="datetimeFigureOut">
+              <a:rPr lang="en-US" smtClean="0"/>
+              <a:t>11/17/25</a:t>
+            </a:fld>
+            <a:endParaRPr lang="en-US"/>
+          </a:p>
+        </p:txBody>
+      </p:sp>
+      <p:sp>
+        <p:nvSpPr>
+          <p:cNvPr id="5" name="Footer Placeholder 4">
+            <a:extLst>
+              <a:ext uri="{FF2B5EF4-FFF2-40B4-BE49-F238E27FC236}">
+                <a16:creationId xmlns:a16="http://schemas.microsoft.com/office/drawing/2014/main" id="{95D6491C-9C59-AD40-9439-2F742533CB9B}"/>
+              </a:ext>
+            </a:extLst>
+          </p:cNvPr>
+          <p:cNvSpPr>
+            <a:spLocks noGrp="1"/>
+          </p:cNvSpPr>
+          <p:nvPr>
+            <p:ph type="ftr" sz="quarter" idx="11"/>
+          </p:nvPr>
+        </p:nvSpPr>
+        <p:spPr/>
+        <p:txBody>
+          <a:bodyPr/>
+          <a:lstStyle/>
+          <a:p>
+            <a:endParaRPr lang="en-US"/>
+          </a:p>
+        </p:txBody>
+      </p:sp>
+      <p:sp>
+        <p:nvSpPr>
+          <p:cNvPr id="6" name="Slide Number Placeholder 5">
+            <a:extLst>
+              <a:ext uri="{FF2B5EF4-FFF2-40B4-BE49-F238E27FC236}">
+                <a16:creationId xmlns:a16="http://schemas.microsoft.com/office/drawing/2014/main" id="{42AE409B-A3F7-D84E-AE98-AD8BEBDED7DB}"/>
+              </a:ext>
+            </a:extLst>
+          </p:cNvPr>
+          <p:cNvSpPr>
+            <a:spLocks noGrp="1"/>
+          </p:cNvSpPr>
+          <p:nvPr>
+            <p:ph type="sldNum" sz="quarter" idx="12"/>
+          </p:nvPr>
+        </p:nvSpPr>
+        <p:spPr/>
+        <p:txBody>
+          <a:bodyPr/>
+          <a:lstStyle/>
+          <a:p>
+            <a:fld id="{2965B623-7B3A-A84B-8D9E-879E368CC615}" type="slidenum">
+              <a:rPr lang="en-US" smtClean="0"/>
+              <a:t>‹#›</a:t>
+            </a:fld>
+            <a:endParaRPr lang="en-US"/>
+          </a:p>
+        </p:txBody>
+      </p:sp>
+    </p:spTree>
+    <p:extLst>
+      <p:ext uri="{BB962C8B-B14F-4D97-AF65-F5344CB8AC3E}">
+        <p14:creationId xmlns:p14="http://schemas.microsoft.com/office/powerpoint/2010/main" val="1619927092"/>
+      </p:ext>
+    </p:extLst>
+  </p:cSld>
+  <p:clrMapOvr>
+    <a:masterClrMapping/>
+  </p:clrMapOvr>
+</p:sldLayout>
+</file>
+
 <file path=ppt/slideMasters/slideMaster1.xml><?xml version="1.0" encoding="utf-8"?>
 <p:sldMaster xmlns:a="http://schemas.openxmlformats.org/drawingml/2006/main" xmlns:r="http://schemas.openxmlformats.org/officeDocument/2006/relationships" xmlns:p="http://schemas.openxmlformats.org/presentationml/2006/main">
   <p:cSld>
@@ -2083,7 +2294,7 @@
           </p:cNvGraphicFramePr>
           <p:nvPr userDrawn="1">
             <p:custDataLst>
-              <p:tags r:id="rId5"/>
+              <p:tags r:id="rId6"/>
             </p:custDataLst>
             <p:extLst>
               <p:ext uri="{D42A27DB-BD31-4B8C-83A1-F6EECF244321}">
@@ -2100,12 +2311,12 @@
           <a:graphicData uri="http://schemas.openxmlformats.org/presentationml/2006/ole">
             <mc:AlternateContent xmlns:mc="http://schemas.openxmlformats.org/markup-compatibility/2006">
               <mc:Choice xmlns:v="urn:schemas-microsoft-com:vml" Requires="v">
-                <p:oleObj name="think-cell Slide" r:id="rId6" imgW="270" imgH="270" progId="TCLayout.ActiveDocument.1">
+                <p:oleObj name="think-cell Slide" r:id="rId7" imgW="270" imgH="270" progId="TCLayout.ActiveDocument.1">
                   <p:embed/>
                 </p:oleObj>
               </mc:Choice>
               <mc:Fallback>
-                <p:oleObj name="think-cell Slide" r:id="rId6" imgW="270" imgH="270" progId="TCLayout.ActiveDocument.1">
+                <p:oleObj name="think-cell Slide" r:id="rId7" imgW="270" imgH="270" progId="TCLayout.ActiveDocument.1">
                   <p:embed/>
                   <p:pic>
                     <p:nvPicPr>
@@ -2114,7 +2325,7 @@
                       <p:nvPr/>
                     </p:nvPicPr>
                     <p:blipFill>
-                      <a:blip r:embed="rId7"/>
+                      <a:blip r:embed="rId8"/>
                       <a:stretch>
                         <a:fillRect/>
                       </a:stretch>
@@ -2180,6 +2391,7 @@
     <p:sldLayoutId id="2147483649" r:id="rId1"/>
     <p:sldLayoutId id="2147483654" r:id="rId2"/>
     <p:sldLayoutId id="2147483656" r:id="rId3"/>
+    <p:sldLayoutId id="2147483657" r:id="rId4"/>
   </p:sldLayoutIdLst>
   <p:txStyles>
     <p:titleStyle>
@@ -5720,6 +5932,2394 @@
 </p:sld>
 </file>
 
+<file path=ppt/slides/slide4.xml><?xml version="1.0" encoding="utf-8"?>
+<p:sld xmlns:a="http://schemas.openxmlformats.org/drawingml/2006/main" xmlns:r="http://schemas.openxmlformats.org/officeDocument/2006/relationships" xmlns:p="http://schemas.openxmlformats.org/presentationml/2006/main">
+  <p:cSld>
+    <p:spTree>
+      <p:nvGrpSpPr>
+        <p:cNvPr id="1" name=""/>
+        <p:cNvGrpSpPr/>
+        <p:nvPr/>
+      </p:nvGrpSpPr>
+      <p:grpSpPr>
+        <a:xfrm>
+          <a:off x="0" y="0"/>
+          <a:ext cx="0" cy="0"/>
+          <a:chOff x="0" y="0"/>
+          <a:chExt cx="0" cy="0"/>
+        </a:xfrm>
+      </p:grpSpPr>
+      <p:graphicFrame>
+        <p:nvGraphicFramePr>
+          <p:cNvPr id="23" name="Object 22" hidden="1">
+            <a:extLst>
+              <a:ext uri="{FF2B5EF4-FFF2-40B4-BE49-F238E27FC236}">
+                <a16:creationId xmlns:a16="http://schemas.microsoft.com/office/drawing/2014/main" id="{AE2BE18D-A266-3746-AFAB-EAFEB87A6E4A}"/>
+              </a:ext>
+            </a:extLst>
+          </p:cNvPr>
+          <p:cNvGraphicFramePr>
+            <a:graphicFrameLocks noChangeAspect="1"/>
+          </p:cNvGraphicFramePr>
+          <p:nvPr>
+            <p:custDataLst>
+              <p:tags r:id="rId1"/>
+            </p:custDataLst>
+          </p:nvPr>
+        </p:nvGraphicFramePr>
+        <p:xfrm>
+          <a:off x="1192" y="858441"/>
+          <a:ext cx="920" cy="1191"/>
+        </p:xfrm>
+        <a:graphic>
+          <a:graphicData uri="http://schemas.openxmlformats.org/presentationml/2006/ole">
+            <mc:AlternateContent xmlns:mc="http://schemas.openxmlformats.org/markup-compatibility/2006">
+              <mc:Choice xmlns:v="urn:schemas-microsoft-com:vml" Requires="v">
+                <p:oleObj name="think-cell Slide" r:id="rId3" imgW="7772400" imgH="10058400" progId="TCLayout.ActiveDocument.1">
+                  <p:embed/>
+                </p:oleObj>
+              </mc:Choice>
+              <mc:Fallback>
+                <p:oleObj name="think-cell Slide" r:id="rId3" imgW="7772400" imgH="10058400" progId="TCLayout.ActiveDocument.1">
+                  <p:embed/>
+                  <p:pic>
+                    <p:nvPicPr>
+                      <p:cNvPr id="23" name="Object 22" hidden="1">
+                        <a:extLst>
+                          <a:ext uri="{FF2B5EF4-FFF2-40B4-BE49-F238E27FC236}">
+                            <a16:creationId xmlns:a16="http://schemas.microsoft.com/office/drawing/2014/main" id="{AE2BE18D-A266-3746-AFAB-EAFEB87A6E4A}"/>
+                          </a:ext>
+                        </a:extLst>
+                      </p:cNvPr>
+                      <p:cNvPicPr/>
+                      <p:nvPr/>
+                    </p:nvPicPr>
+                    <p:blipFill>
+                      <a:blip r:embed="rId4"/>
+                      <a:stretch>
+                        <a:fillRect/>
+                      </a:stretch>
+                    </p:blipFill>
+                    <p:spPr>
+                      <a:xfrm>
+                        <a:off x="1192" y="858441"/>
+                        <a:ext cx="920" cy="1191"/>
+                      </a:xfrm>
+                      <a:prstGeom prst="rect">
+                        <a:avLst/>
+                      </a:prstGeom>
+                    </p:spPr>
+                  </p:pic>
+                </p:oleObj>
+              </mc:Fallback>
+            </mc:AlternateContent>
+          </a:graphicData>
+        </a:graphic>
+      </p:graphicFrame>
+      <p:grpSp>
+        <p:nvGrpSpPr>
+          <p:cNvPr id="4" name="Group 3">
+            <a:extLst>
+              <a:ext uri="{FF2B5EF4-FFF2-40B4-BE49-F238E27FC236}">
+                <a16:creationId xmlns:a16="http://schemas.microsoft.com/office/drawing/2014/main" id="{D25B1BBF-47EF-D24A-A060-B6DC7C5C5AC2}"/>
+              </a:ext>
+            </a:extLst>
+          </p:cNvPr>
+          <p:cNvGrpSpPr/>
+          <p:nvPr/>
+        </p:nvGrpSpPr>
+        <p:grpSpPr>
+          <a:xfrm>
+            <a:off x="2343775" y="1552053"/>
+            <a:ext cx="3920385" cy="3482202"/>
+            <a:chOff x="2731679" y="1272151"/>
+            <a:chExt cx="4057471" cy="3960553"/>
+          </a:xfrm>
+        </p:grpSpPr>
+        <p:sp>
+          <p:nvSpPr>
+            <p:cNvPr id="5" name="TextBox 4">
+              <a:extLst>
+                <a:ext uri="{FF2B5EF4-FFF2-40B4-BE49-F238E27FC236}">
+                  <a16:creationId xmlns:a16="http://schemas.microsoft.com/office/drawing/2014/main" id="{20D4C3E4-477C-9D48-959B-5BF2423A8284}"/>
+                </a:ext>
+              </a:extLst>
+            </p:cNvPr>
+            <p:cNvSpPr txBox="1"/>
+            <p:nvPr/>
+          </p:nvSpPr>
+          <p:spPr>
+            <a:xfrm>
+              <a:off x="4419754" y="1272151"/>
+              <a:ext cx="722021" cy="315050"/>
+            </a:xfrm>
+            <a:prstGeom prst="rect">
+              <a:avLst/>
+            </a:prstGeom>
+            <a:noFill/>
+          </p:spPr>
+          <p:txBody>
+            <a:bodyPr wrap="none" rtlCol="0">
+              <a:spAutoFit/>
+            </a:bodyPr>
+            <a:lstStyle/>
+            <a:p>
+              <a:r>
+                <a:rPr lang="en-US" sz="1200" b="1" dirty="0">
+                  <a:latin typeface="Helvetica" pitchFamily="2" charset="0"/>
+                </a:rPr>
+                <a:t>Theory</a:t>
+              </a:r>
+            </a:p>
+          </p:txBody>
+        </p:sp>
+        <p:sp>
+          <p:nvSpPr>
+            <p:cNvPr id="6" name="TextBox 5">
+              <a:extLst>
+                <a:ext uri="{FF2B5EF4-FFF2-40B4-BE49-F238E27FC236}">
+                  <a16:creationId xmlns:a16="http://schemas.microsoft.com/office/drawing/2014/main" id="{98478C1B-C1F1-9843-8E1E-22D0D20BD88D}"/>
+                </a:ext>
+              </a:extLst>
+            </p:cNvPr>
+            <p:cNvSpPr txBox="1"/>
+            <p:nvPr/>
+          </p:nvSpPr>
+          <p:spPr>
+            <a:xfrm>
+              <a:off x="2801815" y="3141787"/>
+              <a:ext cx="740271" cy="315050"/>
+            </a:xfrm>
+            <a:prstGeom prst="rect">
+              <a:avLst/>
+            </a:prstGeom>
+            <a:noFill/>
+          </p:spPr>
+          <p:txBody>
+            <a:bodyPr wrap="none" rtlCol="0">
+              <a:spAutoFit/>
+            </a:bodyPr>
+            <a:lstStyle/>
+            <a:p>
+              <a:r>
+                <a:rPr lang="en-US" sz="1200" b="1" dirty="0">
+                  <a:latin typeface="Helvetica" pitchFamily="2" charset="0"/>
+                </a:rPr>
+                <a:t>Models</a:t>
+              </a:r>
+            </a:p>
+          </p:txBody>
+        </p:sp>
+        <p:sp>
+          <p:nvSpPr>
+            <p:cNvPr id="7" name="TextBox 6">
+              <a:extLst>
+                <a:ext uri="{FF2B5EF4-FFF2-40B4-BE49-F238E27FC236}">
+                  <a16:creationId xmlns:a16="http://schemas.microsoft.com/office/drawing/2014/main" id="{0815A356-4EE0-474D-BE65-481505C8FB1E}"/>
+                </a:ext>
+              </a:extLst>
+            </p:cNvPr>
+            <p:cNvSpPr txBox="1"/>
+            <p:nvPr/>
+          </p:nvSpPr>
+          <p:spPr>
+            <a:xfrm>
+              <a:off x="5900396" y="3141787"/>
+              <a:ext cx="534548" cy="315050"/>
+            </a:xfrm>
+            <a:prstGeom prst="rect">
+              <a:avLst/>
+            </a:prstGeom>
+            <a:noFill/>
+          </p:spPr>
+          <p:txBody>
+            <a:bodyPr wrap="none" rtlCol="0">
+              <a:spAutoFit/>
+            </a:bodyPr>
+            <a:lstStyle/>
+            <a:p>
+              <a:r>
+                <a:rPr lang="en-US" sz="1200" b="1" dirty="0">
+                  <a:latin typeface="Helvetica" pitchFamily="2" charset="0"/>
+                </a:rPr>
+                <a:t>Data</a:t>
+              </a:r>
+            </a:p>
+          </p:txBody>
+        </p:sp>
+        <p:cxnSp>
+          <p:nvCxnSpPr>
+            <p:cNvPr id="8" name="Straight Arrow Connector 7">
+              <a:extLst>
+                <a:ext uri="{FF2B5EF4-FFF2-40B4-BE49-F238E27FC236}">
+                  <a16:creationId xmlns:a16="http://schemas.microsoft.com/office/drawing/2014/main" id="{40F3E224-EC2C-2340-9194-6476AF1B8B6A}"/>
+                </a:ext>
+              </a:extLst>
+            </p:cNvPr>
+            <p:cNvCxnSpPr>
+              <a:cxnSpLocks/>
+            </p:cNvCxnSpPr>
+            <p:nvPr/>
+          </p:nvCxnSpPr>
+          <p:spPr>
+            <a:xfrm flipH="1">
+              <a:off x="3220062" y="1641483"/>
+              <a:ext cx="1059662" cy="1392424"/>
+            </a:xfrm>
+            <a:prstGeom prst="straightConnector1">
+              <a:avLst/>
+            </a:prstGeom>
+            <a:ln w="57150">
+              <a:tailEnd type="triangle"/>
+            </a:ln>
+          </p:spPr>
+          <p:style>
+            <a:lnRef idx="1">
+              <a:schemeClr val="accent1"/>
+            </a:lnRef>
+            <a:fillRef idx="0">
+              <a:schemeClr val="accent1"/>
+            </a:fillRef>
+            <a:effectRef idx="0">
+              <a:schemeClr val="accent1"/>
+            </a:effectRef>
+            <a:fontRef idx="minor">
+              <a:schemeClr val="tx1"/>
+            </a:fontRef>
+          </p:style>
+        </p:cxnSp>
+        <p:cxnSp>
+          <p:nvCxnSpPr>
+            <p:cNvPr id="9" name="Straight Arrow Connector 8">
+              <a:extLst>
+                <a:ext uri="{FF2B5EF4-FFF2-40B4-BE49-F238E27FC236}">
+                  <a16:creationId xmlns:a16="http://schemas.microsoft.com/office/drawing/2014/main" id="{F7AABDA6-8730-C14A-AC97-9705A8CB13CA}"/>
+                </a:ext>
+              </a:extLst>
+            </p:cNvPr>
+            <p:cNvCxnSpPr>
+              <a:cxnSpLocks/>
+            </p:cNvCxnSpPr>
+            <p:nvPr/>
+          </p:nvCxnSpPr>
+          <p:spPr>
+            <a:xfrm>
+              <a:off x="3758112" y="3197498"/>
+              <a:ext cx="1929962" cy="0"/>
+            </a:xfrm>
+            <a:prstGeom prst="straightConnector1">
+              <a:avLst/>
+            </a:prstGeom>
+            <a:ln w="38100">
+              <a:prstDash val="dash"/>
+              <a:tailEnd type="triangle"/>
+            </a:ln>
+          </p:spPr>
+          <p:style>
+            <a:lnRef idx="1">
+              <a:schemeClr val="accent1"/>
+            </a:lnRef>
+            <a:fillRef idx="0">
+              <a:schemeClr val="accent1"/>
+            </a:fillRef>
+            <a:effectRef idx="0">
+              <a:schemeClr val="accent1"/>
+            </a:effectRef>
+            <a:fontRef idx="minor">
+              <a:schemeClr val="tx1"/>
+            </a:fontRef>
+          </p:style>
+        </p:cxnSp>
+        <p:cxnSp>
+          <p:nvCxnSpPr>
+            <p:cNvPr id="10" name="Straight Arrow Connector 9">
+              <a:extLst>
+                <a:ext uri="{FF2B5EF4-FFF2-40B4-BE49-F238E27FC236}">
+                  <a16:creationId xmlns:a16="http://schemas.microsoft.com/office/drawing/2014/main" id="{6448023A-9DC5-964D-8F14-121B2A385417}"/>
+                </a:ext>
+              </a:extLst>
+            </p:cNvPr>
+            <p:cNvCxnSpPr>
+              <a:cxnSpLocks/>
+            </p:cNvCxnSpPr>
+            <p:nvPr/>
+          </p:nvCxnSpPr>
+          <p:spPr>
+            <a:xfrm flipH="1">
+              <a:off x="3749539" y="3341601"/>
+              <a:ext cx="1891641" cy="0"/>
+            </a:xfrm>
+            <a:prstGeom prst="straightConnector1">
+              <a:avLst/>
+            </a:prstGeom>
+            <a:ln w="38100">
+              <a:tailEnd type="triangle"/>
+            </a:ln>
+          </p:spPr>
+          <p:style>
+            <a:lnRef idx="1">
+              <a:schemeClr val="accent1"/>
+            </a:lnRef>
+            <a:fillRef idx="0">
+              <a:schemeClr val="accent1"/>
+            </a:fillRef>
+            <a:effectRef idx="0">
+              <a:schemeClr val="accent1"/>
+            </a:effectRef>
+            <a:fontRef idx="minor">
+              <a:schemeClr val="tx1"/>
+            </a:fontRef>
+          </p:style>
+        </p:cxnSp>
+        <p:cxnSp>
+          <p:nvCxnSpPr>
+            <p:cNvPr id="11" name="Straight Arrow Connector 10">
+              <a:extLst>
+                <a:ext uri="{FF2B5EF4-FFF2-40B4-BE49-F238E27FC236}">
+                  <a16:creationId xmlns:a16="http://schemas.microsoft.com/office/drawing/2014/main" id="{87E7699B-76C7-0E41-9A17-C25AC00923B1}"/>
+                </a:ext>
+              </a:extLst>
+            </p:cNvPr>
+            <p:cNvCxnSpPr>
+              <a:cxnSpLocks/>
+            </p:cNvCxnSpPr>
+            <p:nvPr/>
+          </p:nvCxnSpPr>
+          <p:spPr>
+            <a:xfrm flipH="1" flipV="1">
+              <a:off x="3131890" y="3553045"/>
+              <a:ext cx="824523" cy="1250343"/>
+            </a:xfrm>
+            <a:prstGeom prst="straightConnector1">
+              <a:avLst/>
+            </a:prstGeom>
+            <a:ln w="12700">
+              <a:solidFill>
+                <a:schemeClr val="accent1"/>
+              </a:solidFill>
+              <a:prstDash val="dash"/>
+              <a:tailEnd type="triangle"/>
+            </a:ln>
+          </p:spPr>
+          <p:style>
+            <a:lnRef idx="1">
+              <a:schemeClr val="accent1"/>
+            </a:lnRef>
+            <a:fillRef idx="0">
+              <a:schemeClr val="accent1"/>
+            </a:fillRef>
+            <a:effectRef idx="0">
+              <a:schemeClr val="accent1"/>
+            </a:effectRef>
+            <a:fontRef idx="minor">
+              <a:schemeClr val="tx1"/>
+            </a:fontRef>
+          </p:style>
+        </p:cxnSp>
+        <p:cxnSp>
+          <p:nvCxnSpPr>
+            <p:cNvPr id="12" name="Straight Arrow Connector 11">
+              <a:extLst>
+                <a:ext uri="{FF2B5EF4-FFF2-40B4-BE49-F238E27FC236}">
+                  <a16:creationId xmlns:a16="http://schemas.microsoft.com/office/drawing/2014/main" id="{D616CD23-4604-0348-B252-F325E5CD44DB}"/>
+                </a:ext>
+              </a:extLst>
+            </p:cNvPr>
+            <p:cNvCxnSpPr>
+              <a:cxnSpLocks/>
+            </p:cNvCxnSpPr>
+            <p:nvPr/>
+          </p:nvCxnSpPr>
+          <p:spPr>
+            <a:xfrm flipV="1">
+              <a:off x="3505351" y="1711683"/>
+              <a:ext cx="1006739" cy="1395715"/>
+            </a:xfrm>
+            <a:prstGeom prst="straightConnector1">
+              <a:avLst/>
+            </a:prstGeom>
+            <a:ln w="12700">
+              <a:tailEnd type="triangle"/>
+            </a:ln>
+          </p:spPr>
+          <p:style>
+            <a:lnRef idx="1">
+              <a:schemeClr val="accent1"/>
+            </a:lnRef>
+            <a:fillRef idx="0">
+              <a:schemeClr val="accent1"/>
+            </a:fillRef>
+            <a:effectRef idx="0">
+              <a:schemeClr val="accent1"/>
+            </a:effectRef>
+            <a:fontRef idx="minor">
+              <a:schemeClr val="tx1"/>
+            </a:fontRef>
+          </p:style>
+        </p:cxnSp>
+        <p:sp>
+          <p:nvSpPr>
+            <p:cNvPr id="13" name="TextBox 12">
+              <a:extLst>
+                <a:ext uri="{FF2B5EF4-FFF2-40B4-BE49-F238E27FC236}">
+                  <a16:creationId xmlns:a16="http://schemas.microsoft.com/office/drawing/2014/main" id="{D8FDC9FE-DF56-B945-B3AC-EC0FF27FA918}"/>
+                </a:ext>
+              </a:extLst>
+            </p:cNvPr>
+            <p:cNvSpPr txBox="1"/>
+            <p:nvPr/>
+          </p:nvSpPr>
+          <p:spPr>
+            <a:xfrm>
+              <a:off x="4393284" y="3330714"/>
+              <a:ext cx="813270" cy="288796"/>
+            </a:xfrm>
+            <a:prstGeom prst="rect">
+              <a:avLst/>
+            </a:prstGeom>
+            <a:noFill/>
+          </p:spPr>
+          <p:txBody>
+            <a:bodyPr wrap="none" rtlCol="0">
+              <a:spAutoFit/>
+            </a:bodyPr>
+            <a:lstStyle/>
+            <a:p>
+              <a:r>
+                <a:rPr lang="en-US" sz="1050" dirty="0">
+                  <a:latin typeface="Helvetica" pitchFamily="2" charset="0"/>
+                </a:rPr>
+                <a:t>Abduction</a:t>
+              </a:r>
+            </a:p>
+          </p:txBody>
+        </p:sp>
+        <p:sp>
+          <p:nvSpPr>
+            <p:cNvPr id="14" name="TextBox 13">
+              <a:extLst>
+                <a:ext uri="{FF2B5EF4-FFF2-40B4-BE49-F238E27FC236}">
+                  <a16:creationId xmlns:a16="http://schemas.microsoft.com/office/drawing/2014/main" id="{6E6FE993-16C9-0C49-B78B-88B10C8F6FE2}"/>
+                </a:ext>
+              </a:extLst>
+            </p:cNvPr>
+            <p:cNvSpPr txBox="1"/>
+            <p:nvPr/>
+          </p:nvSpPr>
+          <p:spPr>
+            <a:xfrm>
+              <a:off x="2849968" y="2205671"/>
+              <a:ext cx="1166278" cy="288796"/>
+            </a:xfrm>
+            <a:prstGeom prst="rect">
+              <a:avLst/>
+            </a:prstGeom>
+            <a:noFill/>
+          </p:spPr>
+          <p:txBody>
+            <a:bodyPr wrap="square" rtlCol="0">
+              <a:spAutoFit/>
+            </a:bodyPr>
+            <a:lstStyle/>
+            <a:p>
+              <a:r>
+                <a:rPr lang="en-US" sz="1050" dirty="0">
+                  <a:latin typeface="Helvetica" pitchFamily="2" charset="0"/>
+                </a:rPr>
+                <a:t>Deduction</a:t>
+              </a:r>
+            </a:p>
+          </p:txBody>
+        </p:sp>
+        <p:sp>
+          <p:nvSpPr>
+            <p:cNvPr id="15" name="TextBox 14">
+              <a:extLst>
+                <a:ext uri="{FF2B5EF4-FFF2-40B4-BE49-F238E27FC236}">
+                  <a16:creationId xmlns:a16="http://schemas.microsoft.com/office/drawing/2014/main" id="{9EB1749C-256C-AA44-86AB-1440F3748A19}"/>
+                </a:ext>
+              </a:extLst>
+            </p:cNvPr>
+            <p:cNvSpPr txBox="1"/>
+            <p:nvPr/>
+          </p:nvSpPr>
+          <p:spPr>
+            <a:xfrm>
+              <a:off x="4127080" y="2205671"/>
+              <a:ext cx="758520" cy="288796"/>
+            </a:xfrm>
+            <a:prstGeom prst="rect">
+              <a:avLst/>
+            </a:prstGeom>
+            <a:noFill/>
+          </p:spPr>
+          <p:txBody>
+            <a:bodyPr wrap="none" rtlCol="0">
+              <a:spAutoFit/>
+            </a:bodyPr>
+            <a:lstStyle/>
+            <a:p>
+              <a:r>
+                <a:rPr lang="en-US" sz="1050" dirty="0">
+                  <a:latin typeface="Helvetica" pitchFamily="2" charset="0"/>
+                </a:rPr>
+                <a:t>Induction</a:t>
+              </a:r>
+            </a:p>
+          </p:txBody>
+        </p:sp>
+        <p:sp>
+          <p:nvSpPr>
+            <p:cNvPr id="16" name="TextBox 15">
+              <a:extLst>
+                <a:ext uri="{FF2B5EF4-FFF2-40B4-BE49-F238E27FC236}">
+                  <a16:creationId xmlns:a16="http://schemas.microsoft.com/office/drawing/2014/main" id="{2E7CA445-B3A1-234C-ACC0-F73DFB6EC190}"/>
+                </a:ext>
+              </a:extLst>
+            </p:cNvPr>
+            <p:cNvSpPr txBox="1"/>
+            <p:nvPr/>
+          </p:nvSpPr>
+          <p:spPr>
+            <a:xfrm>
+              <a:off x="4477724" y="2915163"/>
+              <a:ext cx="649023" cy="288796"/>
+            </a:xfrm>
+            <a:prstGeom prst="rect">
+              <a:avLst/>
+            </a:prstGeom>
+            <a:noFill/>
+          </p:spPr>
+          <p:txBody>
+            <a:bodyPr wrap="none" rtlCol="0">
+              <a:spAutoFit/>
+            </a:bodyPr>
+            <a:lstStyle/>
+            <a:p>
+              <a:r>
+                <a:rPr lang="en-US" sz="1050" dirty="0">
+                  <a:latin typeface="Helvetica" pitchFamily="2" charset="0"/>
+                </a:rPr>
+                <a:t>Testing</a:t>
+              </a:r>
+            </a:p>
+          </p:txBody>
+        </p:sp>
+        <p:sp>
+          <p:nvSpPr>
+            <p:cNvPr id="17" name="TextBox 16">
+              <a:extLst>
+                <a:ext uri="{FF2B5EF4-FFF2-40B4-BE49-F238E27FC236}">
+                  <a16:creationId xmlns:a16="http://schemas.microsoft.com/office/drawing/2014/main" id="{6AB31055-5379-3040-941A-C23D738A3E32}"/>
+                </a:ext>
+              </a:extLst>
+            </p:cNvPr>
+            <p:cNvSpPr txBox="1"/>
+            <p:nvPr/>
+          </p:nvSpPr>
+          <p:spPr>
+            <a:xfrm>
+              <a:off x="4178235" y="4917654"/>
+              <a:ext cx="1201489" cy="315050"/>
+            </a:xfrm>
+            <a:prstGeom prst="rect">
+              <a:avLst/>
+            </a:prstGeom>
+            <a:noFill/>
+          </p:spPr>
+          <p:txBody>
+            <a:bodyPr wrap="none" rtlCol="0">
+              <a:spAutoFit/>
+            </a:bodyPr>
+            <a:lstStyle/>
+            <a:p>
+              <a:r>
+                <a:rPr lang="en-US" sz="1200" b="1" dirty="0">
+                  <a:latin typeface="Helvetica" pitchFamily="2" charset="0"/>
+                </a:rPr>
+                <a:t>Phenomenon</a:t>
+              </a:r>
+            </a:p>
+          </p:txBody>
+        </p:sp>
+        <p:cxnSp>
+          <p:nvCxnSpPr>
+            <p:cNvPr id="18" name="Straight Arrow Connector 17">
+              <a:extLst>
+                <a:ext uri="{FF2B5EF4-FFF2-40B4-BE49-F238E27FC236}">
+                  <a16:creationId xmlns:a16="http://schemas.microsoft.com/office/drawing/2014/main" id="{9D8476D4-A88A-F340-89A3-E92E7BDE8731}"/>
+                </a:ext>
+              </a:extLst>
+            </p:cNvPr>
+            <p:cNvCxnSpPr>
+              <a:cxnSpLocks/>
+            </p:cNvCxnSpPr>
+            <p:nvPr/>
+          </p:nvCxnSpPr>
+          <p:spPr>
+            <a:xfrm flipV="1">
+              <a:off x="5261202" y="3600715"/>
+              <a:ext cx="817838" cy="1202223"/>
+            </a:xfrm>
+            <a:prstGeom prst="straightConnector1">
+              <a:avLst/>
+            </a:prstGeom>
+            <a:ln w="38100">
+              <a:solidFill>
+                <a:schemeClr val="accent1"/>
+              </a:solidFill>
+              <a:prstDash val="dash"/>
+              <a:tailEnd type="triangle"/>
+            </a:ln>
+          </p:spPr>
+          <p:style>
+            <a:lnRef idx="1">
+              <a:schemeClr val="accent1"/>
+            </a:lnRef>
+            <a:fillRef idx="0">
+              <a:schemeClr val="accent1"/>
+            </a:fillRef>
+            <a:effectRef idx="0">
+              <a:schemeClr val="accent1"/>
+            </a:effectRef>
+            <a:fontRef idx="minor">
+              <a:schemeClr val="tx1"/>
+            </a:fontRef>
+          </p:style>
+        </p:cxnSp>
+        <p:sp>
+          <p:nvSpPr>
+            <p:cNvPr id="19" name="TextBox 18">
+              <a:extLst>
+                <a:ext uri="{FF2B5EF4-FFF2-40B4-BE49-F238E27FC236}">
+                  <a16:creationId xmlns:a16="http://schemas.microsoft.com/office/drawing/2014/main" id="{3293BE63-7322-D74C-B72D-4AE68D756A59}"/>
+                </a:ext>
+              </a:extLst>
+            </p:cNvPr>
+            <p:cNvSpPr txBox="1"/>
+            <p:nvPr/>
+          </p:nvSpPr>
+          <p:spPr>
+            <a:xfrm>
+              <a:off x="5982516" y="4024466"/>
+              <a:ext cx="806634" cy="288797"/>
+            </a:xfrm>
+            <a:prstGeom prst="rect">
+              <a:avLst/>
+            </a:prstGeom>
+            <a:noFill/>
+          </p:spPr>
+          <p:txBody>
+            <a:bodyPr wrap="none" rtlCol="0">
+              <a:spAutoFit/>
+            </a:bodyPr>
+            <a:lstStyle/>
+            <a:p>
+              <a:r>
+                <a:rPr lang="en-US" sz="1050" dirty="0">
+                  <a:latin typeface="Helvetica" pitchFamily="2" charset="0"/>
+                </a:rPr>
+                <a:t>Collection</a:t>
+              </a:r>
+            </a:p>
+          </p:txBody>
+        </p:sp>
+        <p:sp>
+          <p:nvSpPr>
+            <p:cNvPr id="20" name="TextBox 19">
+              <a:extLst>
+                <a:ext uri="{FF2B5EF4-FFF2-40B4-BE49-F238E27FC236}">
+                  <a16:creationId xmlns:a16="http://schemas.microsoft.com/office/drawing/2014/main" id="{52DCE926-DA5B-3543-B0CC-CB1E6534596B}"/>
+                </a:ext>
+              </a:extLst>
+            </p:cNvPr>
+            <p:cNvSpPr txBox="1"/>
+            <p:nvPr/>
+          </p:nvSpPr>
+          <p:spPr>
+            <a:xfrm>
+              <a:off x="2731679" y="4024466"/>
+              <a:ext cx="1963681" cy="288797"/>
+            </a:xfrm>
+            <a:prstGeom prst="rect">
+              <a:avLst/>
+            </a:prstGeom>
+            <a:noFill/>
+          </p:spPr>
+          <p:txBody>
+            <a:bodyPr wrap="square" rtlCol="0">
+              <a:spAutoFit/>
+            </a:bodyPr>
+            <a:lstStyle/>
+            <a:p>
+              <a:r>
+                <a:rPr lang="en-US" sz="1050" dirty="0">
+                  <a:latin typeface="Helvetica" pitchFamily="2" charset="0"/>
+                </a:rPr>
+                <a:t>Situation</a:t>
+              </a:r>
+            </a:p>
+          </p:txBody>
+        </p:sp>
+        <p:cxnSp>
+          <p:nvCxnSpPr>
+            <p:cNvPr id="21" name="Straight Arrow Connector 20">
+              <a:extLst>
+                <a:ext uri="{FF2B5EF4-FFF2-40B4-BE49-F238E27FC236}">
+                  <a16:creationId xmlns:a16="http://schemas.microsoft.com/office/drawing/2014/main" id="{18F80C94-3E6B-9445-BFC9-09D7E90F9CB6}"/>
+                </a:ext>
+              </a:extLst>
+            </p:cNvPr>
+            <p:cNvCxnSpPr>
+              <a:cxnSpLocks/>
+            </p:cNvCxnSpPr>
+            <p:nvPr/>
+          </p:nvCxnSpPr>
+          <p:spPr>
+            <a:xfrm>
+              <a:off x="3433107" y="3553045"/>
+              <a:ext cx="803927" cy="1207965"/>
+            </a:xfrm>
+            <a:prstGeom prst="straightConnector1">
+              <a:avLst/>
+            </a:prstGeom>
+            <a:ln w="12700">
+              <a:solidFill>
+                <a:schemeClr val="accent1"/>
+              </a:solidFill>
+              <a:prstDash val="dash"/>
+              <a:tailEnd type="triangle"/>
+            </a:ln>
+          </p:spPr>
+          <p:style>
+            <a:lnRef idx="1">
+              <a:schemeClr val="accent1"/>
+            </a:lnRef>
+            <a:fillRef idx="0">
+              <a:schemeClr val="accent1"/>
+            </a:fillRef>
+            <a:effectRef idx="0">
+              <a:schemeClr val="accent1"/>
+            </a:effectRef>
+            <a:fontRef idx="minor">
+              <a:schemeClr val="tx1"/>
+            </a:fontRef>
+          </p:style>
+        </p:cxnSp>
+        <p:sp>
+          <p:nvSpPr>
+            <p:cNvPr id="22" name="TextBox 21">
+              <a:extLst>
+                <a:ext uri="{FF2B5EF4-FFF2-40B4-BE49-F238E27FC236}">
+                  <a16:creationId xmlns:a16="http://schemas.microsoft.com/office/drawing/2014/main" id="{58481223-198F-154B-81A3-06C75DB8235A}"/>
+                </a:ext>
+              </a:extLst>
+            </p:cNvPr>
+            <p:cNvSpPr txBox="1"/>
+            <p:nvPr/>
+          </p:nvSpPr>
+          <p:spPr>
+            <a:xfrm>
+              <a:off x="3887587" y="4024466"/>
+              <a:ext cx="1301327" cy="288797"/>
+            </a:xfrm>
+            <a:prstGeom prst="rect">
+              <a:avLst/>
+            </a:prstGeom>
+            <a:noFill/>
+          </p:spPr>
+          <p:txBody>
+            <a:bodyPr wrap="square" rtlCol="0">
+              <a:spAutoFit/>
+            </a:bodyPr>
+            <a:lstStyle/>
+            <a:p>
+              <a:r>
+                <a:rPr lang="en-US" sz="1050" dirty="0">
+                  <a:latin typeface="Helvetica" pitchFamily="2" charset="0"/>
+                </a:rPr>
+                <a:t>Explanation</a:t>
+              </a:r>
+            </a:p>
+          </p:txBody>
+        </p:sp>
+      </p:grpSp>
+      <p:sp>
+        <p:nvSpPr>
+          <p:cNvPr id="2" name="Rectangle 1">
+            <a:extLst>
+              <a:ext uri="{FF2B5EF4-FFF2-40B4-BE49-F238E27FC236}">
+                <a16:creationId xmlns:a16="http://schemas.microsoft.com/office/drawing/2014/main" id="{1650A3DC-D3C4-EF51-9E0E-33A5C6E80D2B}"/>
+              </a:ext>
+            </a:extLst>
+          </p:cNvPr>
+          <p:cNvSpPr/>
+          <p:nvPr/>
+        </p:nvSpPr>
+        <p:spPr>
+          <a:xfrm>
+            <a:off x="1828139" y="1172213"/>
+            <a:ext cx="4937760" cy="4251960"/>
+          </a:xfrm>
+          <a:prstGeom prst="rect">
+            <a:avLst/>
+          </a:prstGeom>
+          <a:noFill/>
+        </p:spPr>
+        <p:style>
+          <a:lnRef idx="2">
+            <a:schemeClr val="accent1">
+              <a:shade val="15000"/>
+            </a:schemeClr>
+          </a:lnRef>
+          <a:fillRef idx="1">
+            <a:schemeClr val="accent1"/>
+          </a:fillRef>
+          <a:effectRef idx="0">
+            <a:schemeClr val="accent1"/>
+          </a:effectRef>
+          <a:fontRef idx="minor">
+            <a:schemeClr val="lt1"/>
+          </a:fontRef>
+        </p:style>
+        <p:txBody>
+          <a:bodyPr rtlCol="0" anchor="ctr"/>
+          <a:lstStyle/>
+          <a:p>
+            <a:pPr algn="ctr"/>
+            <a:endParaRPr lang="en-US" sz="1350"/>
+          </a:p>
+        </p:txBody>
+      </p:sp>
+    </p:spTree>
+    <p:extLst>
+      <p:ext uri="{BB962C8B-B14F-4D97-AF65-F5344CB8AC3E}">
+        <p14:creationId xmlns:p14="http://schemas.microsoft.com/office/powerpoint/2010/main" val="3924530274"/>
+      </p:ext>
+    </p:extLst>
+  </p:cSld>
+  <p:clrMapOvr>
+    <a:masterClrMapping/>
+  </p:clrMapOvr>
+</p:sld>
+</file>
+
+<file path=ppt/slides/slide5.xml><?xml version="1.0" encoding="utf-8"?>
+<p:sld xmlns:a="http://schemas.openxmlformats.org/drawingml/2006/main" xmlns:r="http://schemas.openxmlformats.org/officeDocument/2006/relationships" xmlns:p="http://schemas.openxmlformats.org/presentationml/2006/main">
+  <p:cSld>
+    <p:spTree>
+      <p:nvGrpSpPr>
+        <p:cNvPr id="1" name="">
+          <a:extLst>
+            <a:ext uri="{FF2B5EF4-FFF2-40B4-BE49-F238E27FC236}">
+              <a16:creationId xmlns:a16="http://schemas.microsoft.com/office/drawing/2014/main" id="{ED628C3D-B828-8971-DD48-B9D082174247}"/>
+            </a:ext>
+          </a:extLst>
+        </p:cNvPr>
+        <p:cNvGrpSpPr/>
+        <p:nvPr/>
+      </p:nvGrpSpPr>
+      <p:grpSpPr>
+        <a:xfrm>
+          <a:off x="0" y="0"/>
+          <a:ext cx="0" cy="0"/>
+          <a:chOff x="0" y="0"/>
+          <a:chExt cx="0" cy="0"/>
+        </a:xfrm>
+      </p:grpSpPr>
+      <p:graphicFrame>
+        <p:nvGraphicFramePr>
+          <p:cNvPr id="23" name="Object 22" hidden="1">
+            <a:extLst>
+              <a:ext uri="{FF2B5EF4-FFF2-40B4-BE49-F238E27FC236}">
+                <a16:creationId xmlns:a16="http://schemas.microsoft.com/office/drawing/2014/main" id="{93EEB4D3-3062-76AA-6F68-4B1967621949}"/>
+              </a:ext>
+            </a:extLst>
+          </p:cNvPr>
+          <p:cNvGraphicFramePr>
+            <a:graphicFrameLocks noChangeAspect="1"/>
+          </p:cNvGraphicFramePr>
+          <p:nvPr>
+            <p:custDataLst>
+              <p:tags r:id="rId1"/>
+            </p:custDataLst>
+          </p:nvPr>
+        </p:nvGraphicFramePr>
+        <p:xfrm>
+          <a:off x="1192" y="858441"/>
+          <a:ext cx="920" cy="1191"/>
+        </p:xfrm>
+        <a:graphic>
+          <a:graphicData uri="http://schemas.openxmlformats.org/presentationml/2006/ole">
+            <mc:AlternateContent xmlns:mc="http://schemas.openxmlformats.org/markup-compatibility/2006">
+              <mc:Choice xmlns:v="urn:schemas-microsoft-com:vml" Requires="v">
+                <p:oleObj name="think-cell Slide" r:id="rId3" imgW="7772400" imgH="10058400" progId="TCLayout.ActiveDocument.1">
+                  <p:embed/>
+                </p:oleObj>
+              </mc:Choice>
+              <mc:Fallback>
+                <p:oleObj name="think-cell Slide" r:id="rId3" imgW="7772400" imgH="10058400" progId="TCLayout.ActiveDocument.1">
+                  <p:embed/>
+                  <p:pic>
+                    <p:nvPicPr>
+                      <p:cNvPr id="23" name="Object 22" hidden="1">
+                        <a:extLst>
+                          <a:ext uri="{FF2B5EF4-FFF2-40B4-BE49-F238E27FC236}">
+                            <a16:creationId xmlns:a16="http://schemas.microsoft.com/office/drawing/2014/main" id="{93EEB4D3-3062-76AA-6F68-4B1967621949}"/>
+                          </a:ext>
+                        </a:extLst>
+                      </p:cNvPr>
+                      <p:cNvPicPr/>
+                      <p:nvPr/>
+                    </p:nvPicPr>
+                    <p:blipFill>
+                      <a:blip r:embed="rId4"/>
+                      <a:stretch>
+                        <a:fillRect/>
+                      </a:stretch>
+                    </p:blipFill>
+                    <p:spPr>
+                      <a:xfrm>
+                        <a:off x="1192" y="858441"/>
+                        <a:ext cx="920" cy="1191"/>
+                      </a:xfrm>
+                      <a:prstGeom prst="rect">
+                        <a:avLst/>
+                      </a:prstGeom>
+                    </p:spPr>
+                  </p:pic>
+                </p:oleObj>
+              </mc:Fallback>
+            </mc:AlternateContent>
+          </a:graphicData>
+        </a:graphic>
+      </p:graphicFrame>
+      <p:grpSp>
+        <p:nvGrpSpPr>
+          <p:cNvPr id="4" name="Group 3">
+            <a:extLst>
+              <a:ext uri="{FF2B5EF4-FFF2-40B4-BE49-F238E27FC236}">
+                <a16:creationId xmlns:a16="http://schemas.microsoft.com/office/drawing/2014/main" id="{56FD5166-ECB9-48AD-D6D1-023E11545D25}"/>
+              </a:ext>
+            </a:extLst>
+          </p:cNvPr>
+          <p:cNvGrpSpPr/>
+          <p:nvPr/>
+        </p:nvGrpSpPr>
+        <p:grpSpPr>
+          <a:xfrm>
+            <a:off x="2343775" y="1552053"/>
+            <a:ext cx="3578146" cy="3482202"/>
+            <a:chOff x="2731679" y="1272151"/>
+            <a:chExt cx="3703265" cy="3960553"/>
+          </a:xfrm>
+        </p:grpSpPr>
+        <p:sp>
+          <p:nvSpPr>
+            <p:cNvPr id="5" name="TextBox 4">
+              <a:extLst>
+                <a:ext uri="{FF2B5EF4-FFF2-40B4-BE49-F238E27FC236}">
+                  <a16:creationId xmlns:a16="http://schemas.microsoft.com/office/drawing/2014/main" id="{7CD470D5-94AC-D8ED-95DE-4DCE4B4DA407}"/>
+                </a:ext>
+              </a:extLst>
+            </p:cNvPr>
+            <p:cNvSpPr txBox="1"/>
+            <p:nvPr/>
+          </p:nvSpPr>
+          <p:spPr>
+            <a:xfrm>
+              <a:off x="4419753" y="1272151"/>
+              <a:ext cx="722021" cy="315050"/>
+            </a:xfrm>
+            <a:prstGeom prst="rect">
+              <a:avLst/>
+            </a:prstGeom>
+            <a:noFill/>
+          </p:spPr>
+          <p:txBody>
+            <a:bodyPr wrap="none" rtlCol="0">
+              <a:spAutoFit/>
+            </a:bodyPr>
+            <a:lstStyle/>
+            <a:p>
+              <a:r>
+                <a:rPr lang="en-US" sz="1200" b="1" dirty="0">
+                  <a:latin typeface="Helvetica" pitchFamily="2" charset="0"/>
+                </a:rPr>
+                <a:t>Theory</a:t>
+              </a:r>
+            </a:p>
+          </p:txBody>
+        </p:sp>
+        <p:sp>
+          <p:nvSpPr>
+            <p:cNvPr id="6" name="TextBox 5">
+              <a:extLst>
+                <a:ext uri="{FF2B5EF4-FFF2-40B4-BE49-F238E27FC236}">
+                  <a16:creationId xmlns:a16="http://schemas.microsoft.com/office/drawing/2014/main" id="{4CF36A93-0435-3A1F-0A23-29971228E5DD}"/>
+                </a:ext>
+              </a:extLst>
+            </p:cNvPr>
+            <p:cNvSpPr txBox="1"/>
+            <p:nvPr/>
+          </p:nvSpPr>
+          <p:spPr>
+            <a:xfrm>
+              <a:off x="2801815" y="3141787"/>
+              <a:ext cx="740271" cy="315050"/>
+            </a:xfrm>
+            <a:prstGeom prst="rect">
+              <a:avLst/>
+            </a:prstGeom>
+            <a:noFill/>
+          </p:spPr>
+          <p:txBody>
+            <a:bodyPr wrap="none" rtlCol="0">
+              <a:spAutoFit/>
+            </a:bodyPr>
+            <a:lstStyle/>
+            <a:p>
+              <a:r>
+                <a:rPr lang="en-US" sz="1200" b="1" dirty="0">
+                  <a:latin typeface="Helvetica" pitchFamily="2" charset="0"/>
+                </a:rPr>
+                <a:t>Models</a:t>
+              </a:r>
+            </a:p>
+          </p:txBody>
+        </p:sp>
+        <p:sp>
+          <p:nvSpPr>
+            <p:cNvPr id="7" name="TextBox 6">
+              <a:extLst>
+                <a:ext uri="{FF2B5EF4-FFF2-40B4-BE49-F238E27FC236}">
+                  <a16:creationId xmlns:a16="http://schemas.microsoft.com/office/drawing/2014/main" id="{0284B6D4-7238-18A7-17A9-9D09DD7DE1B7}"/>
+                </a:ext>
+              </a:extLst>
+            </p:cNvPr>
+            <p:cNvSpPr txBox="1"/>
+            <p:nvPr/>
+          </p:nvSpPr>
+          <p:spPr>
+            <a:xfrm>
+              <a:off x="5900396" y="3141787"/>
+              <a:ext cx="534548" cy="315050"/>
+            </a:xfrm>
+            <a:prstGeom prst="rect">
+              <a:avLst/>
+            </a:prstGeom>
+            <a:noFill/>
+          </p:spPr>
+          <p:txBody>
+            <a:bodyPr wrap="none" rtlCol="0">
+              <a:spAutoFit/>
+            </a:bodyPr>
+            <a:lstStyle/>
+            <a:p>
+              <a:r>
+                <a:rPr lang="en-US" sz="1200" b="1" dirty="0">
+                  <a:latin typeface="Helvetica" pitchFamily="2" charset="0"/>
+                </a:rPr>
+                <a:t>Data</a:t>
+              </a:r>
+            </a:p>
+          </p:txBody>
+        </p:sp>
+        <p:cxnSp>
+          <p:nvCxnSpPr>
+            <p:cNvPr id="8" name="Straight Arrow Connector 7">
+              <a:extLst>
+                <a:ext uri="{FF2B5EF4-FFF2-40B4-BE49-F238E27FC236}">
+                  <a16:creationId xmlns:a16="http://schemas.microsoft.com/office/drawing/2014/main" id="{2A14C5F5-8B18-7C7E-B97F-187CED5339BF}"/>
+                </a:ext>
+              </a:extLst>
+            </p:cNvPr>
+            <p:cNvCxnSpPr>
+              <a:cxnSpLocks/>
+            </p:cNvCxnSpPr>
+            <p:nvPr/>
+          </p:nvCxnSpPr>
+          <p:spPr>
+            <a:xfrm flipH="1">
+              <a:off x="3220062" y="1641483"/>
+              <a:ext cx="1059662" cy="1392424"/>
+            </a:xfrm>
+            <a:prstGeom prst="straightConnector1">
+              <a:avLst/>
+            </a:prstGeom>
+            <a:ln w="57150">
+              <a:tailEnd type="triangle"/>
+            </a:ln>
+          </p:spPr>
+          <p:style>
+            <a:lnRef idx="1">
+              <a:schemeClr val="accent1"/>
+            </a:lnRef>
+            <a:fillRef idx="0">
+              <a:schemeClr val="accent1"/>
+            </a:fillRef>
+            <a:effectRef idx="0">
+              <a:schemeClr val="accent1"/>
+            </a:effectRef>
+            <a:fontRef idx="minor">
+              <a:schemeClr val="tx1"/>
+            </a:fontRef>
+          </p:style>
+        </p:cxnSp>
+        <p:cxnSp>
+          <p:nvCxnSpPr>
+            <p:cNvPr id="11" name="Straight Arrow Connector 10">
+              <a:extLst>
+                <a:ext uri="{FF2B5EF4-FFF2-40B4-BE49-F238E27FC236}">
+                  <a16:creationId xmlns:a16="http://schemas.microsoft.com/office/drawing/2014/main" id="{41B53687-2E4B-9423-8DC5-BC9378F196F6}"/>
+                </a:ext>
+              </a:extLst>
+            </p:cNvPr>
+            <p:cNvCxnSpPr>
+              <a:cxnSpLocks/>
+            </p:cNvCxnSpPr>
+            <p:nvPr/>
+          </p:nvCxnSpPr>
+          <p:spPr>
+            <a:xfrm flipH="1" flipV="1">
+              <a:off x="3131890" y="3553045"/>
+              <a:ext cx="824523" cy="1250343"/>
+            </a:xfrm>
+            <a:prstGeom prst="straightConnector1">
+              <a:avLst/>
+            </a:prstGeom>
+            <a:ln w="12700">
+              <a:solidFill>
+                <a:schemeClr val="accent1"/>
+              </a:solidFill>
+              <a:prstDash val="dash"/>
+              <a:tailEnd type="triangle"/>
+            </a:ln>
+          </p:spPr>
+          <p:style>
+            <a:lnRef idx="1">
+              <a:schemeClr val="accent1"/>
+            </a:lnRef>
+            <a:fillRef idx="0">
+              <a:schemeClr val="accent1"/>
+            </a:fillRef>
+            <a:effectRef idx="0">
+              <a:schemeClr val="accent1"/>
+            </a:effectRef>
+            <a:fontRef idx="minor">
+              <a:schemeClr val="tx1"/>
+            </a:fontRef>
+          </p:style>
+        </p:cxnSp>
+        <p:sp>
+          <p:nvSpPr>
+            <p:cNvPr id="14" name="TextBox 13">
+              <a:extLst>
+                <a:ext uri="{FF2B5EF4-FFF2-40B4-BE49-F238E27FC236}">
+                  <a16:creationId xmlns:a16="http://schemas.microsoft.com/office/drawing/2014/main" id="{9B27FD84-11EF-A986-F280-C63DA7A78FB6}"/>
+                </a:ext>
+              </a:extLst>
+            </p:cNvPr>
+            <p:cNvSpPr txBox="1"/>
+            <p:nvPr/>
+          </p:nvSpPr>
+          <p:spPr>
+            <a:xfrm>
+              <a:off x="2849968" y="2205671"/>
+              <a:ext cx="1166278" cy="288796"/>
+            </a:xfrm>
+            <a:prstGeom prst="rect">
+              <a:avLst/>
+            </a:prstGeom>
+            <a:noFill/>
+          </p:spPr>
+          <p:txBody>
+            <a:bodyPr wrap="square" rtlCol="0">
+              <a:spAutoFit/>
+            </a:bodyPr>
+            <a:lstStyle/>
+            <a:p>
+              <a:r>
+                <a:rPr lang="en-US" sz="1050" dirty="0">
+                  <a:latin typeface="Helvetica" pitchFamily="2" charset="0"/>
+                </a:rPr>
+                <a:t>Deduction</a:t>
+              </a:r>
+            </a:p>
+          </p:txBody>
+        </p:sp>
+        <p:sp>
+          <p:nvSpPr>
+            <p:cNvPr id="17" name="TextBox 16">
+              <a:extLst>
+                <a:ext uri="{FF2B5EF4-FFF2-40B4-BE49-F238E27FC236}">
+                  <a16:creationId xmlns:a16="http://schemas.microsoft.com/office/drawing/2014/main" id="{ADEBB1F6-78CB-485B-D330-E321B8BCBBDB}"/>
+                </a:ext>
+              </a:extLst>
+            </p:cNvPr>
+            <p:cNvSpPr txBox="1"/>
+            <p:nvPr/>
+          </p:nvSpPr>
+          <p:spPr>
+            <a:xfrm>
+              <a:off x="4178235" y="4917654"/>
+              <a:ext cx="1201489" cy="315050"/>
+            </a:xfrm>
+            <a:prstGeom prst="rect">
+              <a:avLst/>
+            </a:prstGeom>
+            <a:noFill/>
+          </p:spPr>
+          <p:txBody>
+            <a:bodyPr wrap="none" rtlCol="0">
+              <a:spAutoFit/>
+            </a:bodyPr>
+            <a:lstStyle/>
+            <a:p>
+              <a:r>
+                <a:rPr lang="en-US" sz="1200" b="1" dirty="0">
+                  <a:latin typeface="Helvetica" pitchFamily="2" charset="0"/>
+                </a:rPr>
+                <a:t>Phenomenon</a:t>
+              </a:r>
+            </a:p>
+          </p:txBody>
+        </p:sp>
+        <p:sp>
+          <p:nvSpPr>
+            <p:cNvPr id="20" name="TextBox 19">
+              <a:extLst>
+                <a:ext uri="{FF2B5EF4-FFF2-40B4-BE49-F238E27FC236}">
+                  <a16:creationId xmlns:a16="http://schemas.microsoft.com/office/drawing/2014/main" id="{742B57D5-188C-9359-E064-41A7F9757ED5}"/>
+                </a:ext>
+              </a:extLst>
+            </p:cNvPr>
+            <p:cNvSpPr txBox="1"/>
+            <p:nvPr/>
+          </p:nvSpPr>
+          <p:spPr>
+            <a:xfrm>
+              <a:off x="2731679" y="4024466"/>
+              <a:ext cx="1963681" cy="288797"/>
+            </a:xfrm>
+            <a:prstGeom prst="rect">
+              <a:avLst/>
+            </a:prstGeom>
+            <a:noFill/>
+          </p:spPr>
+          <p:txBody>
+            <a:bodyPr wrap="square" rtlCol="0">
+              <a:spAutoFit/>
+            </a:bodyPr>
+            <a:lstStyle/>
+            <a:p>
+              <a:r>
+                <a:rPr lang="en-US" sz="1050" dirty="0">
+                  <a:latin typeface="Helvetica" pitchFamily="2" charset="0"/>
+                </a:rPr>
+                <a:t>Situation</a:t>
+              </a:r>
+            </a:p>
+          </p:txBody>
+        </p:sp>
+      </p:grpSp>
+      <p:sp>
+        <p:nvSpPr>
+          <p:cNvPr id="2" name="Rectangle 1">
+            <a:extLst>
+              <a:ext uri="{FF2B5EF4-FFF2-40B4-BE49-F238E27FC236}">
+                <a16:creationId xmlns:a16="http://schemas.microsoft.com/office/drawing/2014/main" id="{254B3D3F-C23F-CBA0-21E4-F6ED32CF0C0F}"/>
+              </a:ext>
+            </a:extLst>
+          </p:cNvPr>
+          <p:cNvSpPr/>
+          <p:nvPr/>
+        </p:nvSpPr>
+        <p:spPr>
+          <a:xfrm>
+            <a:off x="1828139" y="1172213"/>
+            <a:ext cx="4937760" cy="4251960"/>
+          </a:xfrm>
+          <a:prstGeom prst="rect">
+            <a:avLst/>
+          </a:prstGeom>
+          <a:noFill/>
+        </p:spPr>
+        <p:style>
+          <a:lnRef idx="2">
+            <a:schemeClr val="accent1">
+              <a:shade val="15000"/>
+            </a:schemeClr>
+          </a:lnRef>
+          <a:fillRef idx="1">
+            <a:schemeClr val="accent1"/>
+          </a:fillRef>
+          <a:effectRef idx="0">
+            <a:schemeClr val="accent1"/>
+          </a:effectRef>
+          <a:fontRef idx="minor">
+            <a:schemeClr val="lt1"/>
+          </a:fontRef>
+        </p:style>
+        <p:txBody>
+          <a:bodyPr rtlCol="0" anchor="ctr"/>
+          <a:lstStyle/>
+          <a:p>
+            <a:pPr algn="ctr"/>
+            <a:endParaRPr lang="en-US" sz="1350"/>
+          </a:p>
+        </p:txBody>
+      </p:sp>
+    </p:spTree>
+    <p:extLst>
+      <p:ext uri="{BB962C8B-B14F-4D97-AF65-F5344CB8AC3E}">
+        <p14:creationId xmlns:p14="http://schemas.microsoft.com/office/powerpoint/2010/main" val="2295375292"/>
+      </p:ext>
+    </p:extLst>
+  </p:cSld>
+  <p:clrMapOvr>
+    <a:masterClrMapping/>
+  </p:clrMapOvr>
+</p:sld>
+</file>
+
+<file path=ppt/slides/slide6.xml><?xml version="1.0" encoding="utf-8"?>
+<p:sld xmlns:a="http://schemas.openxmlformats.org/drawingml/2006/main" xmlns:r="http://schemas.openxmlformats.org/officeDocument/2006/relationships" xmlns:p="http://schemas.openxmlformats.org/presentationml/2006/main">
+  <p:cSld>
+    <p:spTree>
+      <p:nvGrpSpPr>
+        <p:cNvPr id="1" name="">
+          <a:extLst>
+            <a:ext uri="{FF2B5EF4-FFF2-40B4-BE49-F238E27FC236}">
+              <a16:creationId xmlns:a16="http://schemas.microsoft.com/office/drawing/2014/main" id="{23E7F06E-4496-BB81-A176-45EAC9C217F0}"/>
+            </a:ext>
+          </a:extLst>
+        </p:cNvPr>
+        <p:cNvGrpSpPr/>
+        <p:nvPr/>
+      </p:nvGrpSpPr>
+      <p:grpSpPr>
+        <a:xfrm>
+          <a:off x="0" y="0"/>
+          <a:ext cx="0" cy="0"/>
+          <a:chOff x="0" y="0"/>
+          <a:chExt cx="0" cy="0"/>
+        </a:xfrm>
+      </p:grpSpPr>
+      <p:graphicFrame>
+        <p:nvGraphicFramePr>
+          <p:cNvPr id="23" name="Object 22" hidden="1">
+            <a:extLst>
+              <a:ext uri="{FF2B5EF4-FFF2-40B4-BE49-F238E27FC236}">
+                <a16:creationId xmlns:a16="http://schemas.microsoft.com/office/drawing/2014/main" id="{AC69CEA9-A0B9-4212-05D4-9736C4E9AF2C}"/>
+              </a:ext>
+            </a:extLst>
+          </p:cNvPr>
+          <p:cNvGraphicFramePr>
+            <a:graphicFrameLocks noChangeAspect="1"/>
+          </p:cNvGraphicFramePr>
+          <p:nvPr>
+            <p:custDataLst>
+              <p:tags r:id="rId1"/>
+            </p:custDataLst>
+          </p:nvPr>
+        </p:nvGraphicFramePr>
+        <p:xfrm>
+          <a:off x="1192" y="858441"/>
+          <a:ext cx="920" cy="1191"/>
+        </p:xfrm>
+        <a:graphic>
+          <a:graphicData uri="http://schemas.openxmlformats.org/presentationml/2006/ole">
+            <mc:AlternateContent xmlns:mc="http://schemas.openxmlformats.org/markup-compatibility/2006">
+              <mc:Choice xmlns:v="urn:schemas-microsoft-com:vml" Requires="v">
+                <p:oleObj name="think-cell Slide" r:id="rId3" imgW="7772400" imgH="10058400" progId="TCLayout.ActiveDocument.1">
+                  <p:embed/>
+                </p:oleObj>
+              </mc:Choice>
+              <mc:Fallback>
+                <p:oleObj name="think-cell Slide" r:id="rId3" imgW="7772400" imgH="10058400" progId="TCLayout.ActiveDocument.1">
+                  <p:embed/>
+                  <p:pic>
+                    <p:nvPicPr>
+                      <p:cNvPr id="23" name="Object 22" hidden="1">
+                        <a:extLst>
+                          <a:ext uri="{FF2B5EF4-FFF2-40B4-BE49-F238E27FC236}">
+                            <a16:creationId xmlns:a16="http://schemas.microsoft.com/office/drawing/2014/main" id="{AC69CEA9-A0B9-4212-05D4-9736C4E9AF2C}"/>
+                          </a:ext>
+                        </a:extLst>
+                      </p:cNvPr>
+                      <p:cNvPicPr/>
+                      <p:nvPr/>
+                    </p:nvPicPr>
+                    <p:blipFill>
+                      <a:blip r:embed="rId4"/>
+                      <a:stretch>
+                        <a:fillRect/>
+                      </a:stretch>
+                    </p:blipFill>
+                    <p:spPr>
+                      <a:xfrm>
+                        <a:off x="1192" y="858441"/>
+                        <a:ext cx="920" cy="1191"/>
+                      </a:xfrm>
+                      <a:prstGeom prst="rect">
+                        <a:avLst/>
+                      </a:prstGeom>
+                    </p:spPr>
+                  </p:pic>
+                </p:oleObj>
+              </mc:Fallback>
+            </mc:AlternateContent>
+          </a:graphicData>
+        </a:graphic>
+      </p:graphicFrame>
+      <p:grpSp>
+        <p:nvGrpSpPr>
+          <p:cNvPr id="4" name="Group 3">
+            <a:extLst>
+              <a:ext uri="{FF2B5EF4-FFF2-40B4-BE49-F238E27FC236}">
+                <a16:creationId xmlns:a16="http://schemas.microsoft.com/office/drawing/2014/main" id="{85820007-684B-1FFB-743B-7EF39523ED69}"/>
+              </a:ext>
+            </a:extLst>
+          </p:cNvPr>
+          <p:cNvGrpSpPr/>
+          <p:nvPr/>
+        </p:nvGrpSpPr>
+        <p:grpSpPr>
+          <a:xfrm>
+            <a:off x="2411542" y="1552053"/>
+            <a:ext cx="3852618" cy="3482202"/>
+            <a:chOff x="2801815" y="1272151"/>
+            <a:chExt cx="3987335" cy="3960553"/>
+          </a:xfrm>
+        </p:grpSpPr>
+        <p:sp>
+          <p:nvSpPr>
+            <p:cNvPr id="5" name="TextBox 4">
+              <a:extLst>
+                <a:ext uri="{FF2B5EF4-FFF2-40B4-BE49-F238E27FC236}">
+                  <a16:creationId xmlns:a16="http://schemas.microsoft.com/office/drawing/2014/main" id="{B731958D-80E2-9798-7F4D-AC7CB43B1D57}"/>
+                </a:ext>
+              </a:extLst>
+            </p:cNvPr>
+            <p:cNvSpPr txBox="1"/>
+            <p:nvPr/>
+          </p:nvSpPr>
+          <p:spPr>
+            <a:xfrm>
+              <a:off x="4419753" y="1272151"/>
+              <a:ext cx="722021" cy="315050"/>
+            </a:xfrm>
+            <a:prstGeom prst="rect">
+              <a:avLst/>
+            </a:prstGeom>
+            <a:noFill/>
+          </p:spPr>
+          <p:txBody>
+            <a:bodyPr wrap="none" rtlCol="0">
+              <a:spAutoFit/>
+            </a:bodyPr>
+            <a:lstStyle/>
+            <a:p>
+              <a:r>
+                <a:rPr lang="en-US" sz="1200" b="1" dirty="0">
+                  <a:latin typeface="Helvetica" pitchFamily="2" charset="0"/>
+                </a:rPr>
+                <a:t>Theory</a:t>
+              </a:r>
+            </a:p>
+          </p:txBody>
+        </p:sp>
+        <p:sp>
+          <p:nvSpPr>
+            <p:cNvPr id="6" name="TextBox 5">
+              <a:extLst>
+                <a:ext uri="{FF2B5EF4-FFF2-40B4-BE49-F238E27FC236}">
+                  <a16:creationId xmlns:a16="http://schemas.microsoft.com/office/drawing/2014/main" id="{F2373476-CB19-E605-CC33-953D3432F8FB}"/>
+                </a:ext>
+              </a:extLst>
+            </p:cNvPr>
+            <p:cNvSpPr txBox="1"/>
+            <p:nvPr/>
+          </p:nvSpPr>
+          <p:spPr>
+            <a:xfrm>
+              <a:off x="2801815" y="3141787"/>
+              <a:ext cx="740271" cy="315050"/>
+            </a:xfrm>
+            <a:prstGeom prst="rect">
+              <a:avLst/>
+            </a:prstGeom>
+            <a:noFill/>
+          </p:spPr>
+          <p:txBody>
+            <a:bodyPr wrap="none" rtlCol="0">
+              <a:spAutoFit/>
+            </a:bodyPr>
+            <a:lstStyle/>
+            <a:p>
+              <a:r>
+                <a:rPr lang="en-US" sz="1200" b="1" dirty="0">
+                  <a:latin typeface="Helvetica" pitchFamily="2" charset="0"/>
+                </a:rPr>
+                <a:t>Models</a:t>
+              </a:r>
+            </a:p>
+          </p:txBody>
+        </p:sp>
+        <p:sp>
+          <p:nvSpPr>
+            <p:cNvPr id="7" name="TextBox 6">
+              <a:extLst>
+                <a:ext uri="{FF2B5EF4-FFF2-40B4-BE49-F238E27FC236}">
+                  <a16:creationId xmlns:a16="http://schemas.microsoft.com/office/drawing/2014/main" id="{8246F6DA-9EDE-C343-3D78-8E9BD227294F}"/>
+                </a:ext>
+              </a:extLst>
+            </p:cNvPr>
+            <p:cNvSpPr txBox="1"/>
+            <p:nvPr/>
+          </p:nvSpPr>
+          <p:spPr>
+            <a:xfrm>
+              <a:off x="5900396" y="3141787"/>
+              <a:ext cx="534548" cy="315050"/>
+            </a:xfrm>
+            <a:prstGeom prst="rect">
+              <a:avLst/>
+            </a:prstGeom>
+            <a:noFill/>
+          </p:spPr>
+          <p:txBody>
+            <a:bodyPr wrap="none" rtlCol="0">
+              <a:spAutoFit/>
+            </a:bodyPr>
+            <a:lstStyle/>
+            <a:p>
+              <a:r>
+                <a:rPr lang="en-US" sz="1200" b="1" dirty="0">
+                  <a:latin typeface="Helvetica" pitchFamily="2" charset="0"/>
+                </a:rPr>
+                <a:t>Data</a:t>
+              </a:r>
+            </a:p>
+          </p:txBody>
+        </p:sp>
+        <p:cxnSp>
+          <p:nvCxnSpPr>
+            <p:cNvPr id="9" name="Straight Arrow Connector 8">
+              <a:extLst>
+                <a:ext uri="{FF2B5EF4-FFF2-40B4-BE49-F238E27FC236}">
+                  <a16:creationId xmlns:a16="http://schemas.microsoft.com/office/drawing/2014/main" id="{0EAE61E6-29F3-D939-4B7B-237AB42B6F9C}"/>
+                </a:ext>
+              </a:extLst>
+            </p:cNvPr>
+            <p:cNvCxnSpPr>
+              <a:cxnSpLocks/>
+            </p:cNvCxnSpPr>
+            <p:nvPr/>
+          </p:nvCxnSpPr>
+          <p:spPr>
+            <a:xfrm>
+              <a:off x="3758112" y="3197498"/>
+              <a:ext cx="1929962" cy="0"/>
+            </a:xfrm>
+            <a:prstGeom prst="straightConnector1">
+              <a:avLst/>
+            </a:prstGeom>
+            <a:ln w="38100">
+              <a:prstDash val="dash"/>
+              <a:tailEnd type="triangle"/>
+            </a:ln>
+          </p:spPr>
+          <p:style>
+            <a:lnRef idx="1">
+              <a:schemeClr val="accent1"/>
+            </a:lnRef>
+            <a:fillRef idx="0">
+              <a:schemeClr val="accent1"/>
+            </a:fillRef>
+            <a:effectRef idx="0">
+              <a:schemeClr val="accent1"/>
+            </a:effectRef>
+            <a:fontRef idx="minor">
+              <a:schemeClr val="tx1"/>
+            </a:fontRef>
+          </p:style>
+        </p:cxnSp>
+        <p:sp>
+          <p:nvSpPr>
+            <p:cNvPr id="16" name="TextBox 15">
+              <a:extLst>
+                <a:ext uri="{FF2B5EF4-FFF2-40B4-BE49-F238E27FC236}">
+                  <a16:creationId xmlns:a16="http://schemas.microsoft.com/office/drawing/2014/main" id="{276E652D-D980-3FB0-795A-8D05E092B2F1}"/>
+                </a:ext>
+              </a:extLst>
+            </p:cNvPr>
+            <p:cNvSpPr txBox="1"/>
+            <p:nvPr/>
+          </p:nvSpPr>
+          <p:spPr>
+            <a:xfrm>
+              <a:off x="4477724" y="2915163"/>
+              <a:ext cx="649023" cy="288796"/>
+            </a:xfrm>
+            <a:prstGeom prst="rect">
+              <a:avLst/>
+            </a:prstGeom>
+            <a:noFill/>
+          </p:spPr>
+          <p:txBody>
+            <a:bodyPr wrap="none" rtlCol="0">
+              <a:spAutoFit/>
+            </a:bodyPr>
+            <a:lstStyle/>
+            <a:p>
+              <a:r>
+                <a:rPr lang="en-US" sz="1050" dirty="0">
+                  <a:latin typeface="Helvetica" pitchFamily="2" charset="0"/>
+                </a:rPr>
+                <a:t>Testing</a:t>
+              </a:r>
+            </a:p>
+          </p:txBody>
+        </p:sp>
+        <p:sp>
+          <p:nvSpPr>
+            <p:cNvPr id="17" name="TextBox 16">
+              <a:extLst>
+                <a:ext uri="{FF2B5EF4-FFF2-40B4-BE49-F238E27FC236}">
+                  <a16:creationId xmlns:a16="http://schemas.microsoft.com/office/drawing/2014/main" id="{93A440CB-5E3F-BCB1-51E0-EB59B6E5631A}"/>
+                </a:ext>
+              </a:extLst>
+            </p:cNvPr>
+            <p:cNvSpPr txBox="1"/>
+            <p:nvPr/>
+          </p:nvSpPr>
+          <p:spPr>
+            <a:xfrm>
+              <a:off x="4178235" y="4917654"/>
+              <a:ext cx="1201489" cy="315050"/>
+            </a:xfrm>
+            <a:prstGeom prst="rect">
+              <a:avLst/>
+            </a:prstGeom>
+            <a:noFill/>
+          </p:spPr>
+          <p:txBody>
+            <a:bodyPr wrap="none" rtlCol="0">
+              <a:spAutoFit/>
+            </a:bodyPr>
+            <a:lstStyle/>
+            <a:p>
+              <a:r>
+                <a:rPr lang="en-US" sz="1200" b="1" dirty="0">
+                  <a:latin typeface="Helvetica" pitchFamily="2" charset="0"/>
+                </a:rPr>
+                <a:t>Phenomenon</a:t>
+              </a:r>
+            </a:p>
+          </p:txBody>
+        </p:sp>
+        <p:cxnSp>
+          <p:nvCxnSpPr>
+            <p:cNvPr id="18" name="Straight Arrow Connector 17">
+              <a:extLst>
+                <a:ext uri="{FF2B5EF4-FFF2-40B4-BE49-F238E27FC236}">
+                  <a16:creationId xmlns:a16="http://schemas.microsoft.com/office/drawing/2014/main" id="{810ED6C3-A3D2-A914-CD9B-6E34B4079E70}"/>
+                </a:ext>
+              </a:extLst>
+            </p:cNvPr>
+            <p:cNvCxnSpPr>
+              <a:cxnSpLocks/>
+            </p:cNvCxnSpPr>
+            <p:nvPr/>
+          </p:nvCxnSpPr>
+          <p:spPr>
+            <a:xfrm flipV="1">
+              <a:off x="5261202" y="3600715"/>
+              <a:ext cx="817838" cy="1202223"/>
+            </a:xfrm>
+            <a:prstGeom prst="straightConnector1">
+              <a:avLst/>
+            </a:prstGeom>
+            <a:ln w="38100">
+              <a:solidFill>
+                <a:schemeClr val="accent1"/>
+              </a:solidFill>
+              <a:prstDash val="dash"/>
+              <a:tailEnd type="triangle"/>
+            </a:ln>
+          </p:spPr>
+          <p:style>
+            <a:lnRef idx="1">
+              <a:schemeClr val="accent1"/>
+            </a:lnRef>
+            <a:fillRef idx="0">
+              <a:schemeClr val="accent1"/>
+            </a:fillRef>
+            <a:effectRef idx="0">
+              <a:schemeClr val="accent1"/>
+            </a:effectRef>
+            <a:fontRef idx="minor">
+              <a:schemeClr val="tx1"/>
+            </a:fontRef>
+          </p:style>
+        </p:cxnSp>
+        <p:sp>
+          <p:nvSpPr>
+            <p:cNvPr id="19" name="TextBox 18">
+              <a:extLst>
+                <a:ext uri="{FF2B5EF4-FFF2-40B4-BE49-F238E27FC236}">
+                  <a16:creationId xmlns:a16="http://schemas.microsoft.com/office/drawing/2014/main" id="{7F70B744-9129-E24C-B8C5-45E6B6FEEEE0}"/>
+                </a:ext>
+              </a:extLst>
+            </p:cNvPr>
+            <p:cNvSpPr txBox="1"/>
+            <p:nvPr/>
+          </p:nvSpPr>
+          <p:spPr>
+            <a:xfrm>
+              <a:off x="5982516" y="4024466"/>
+              <a:ext cx="806634" cy="288797"/>
+            </a:xfrm>
+            <a:prstGeom prst="rect">
+              <a:avLst/>
+            </a:prstGeom>
+            <a:noFill/>
+          </p:spPr>
+          <p:txBody>
+            <a:bodyPr wrap="none" rtlCol="0">
+              <a:spAutoFit/>
+            </a:bodyPr>
+            <a:lstStyle/>
+            <a:p>
+              <a:r>
+                <a:rPr lang="en-US" sz="1050" dirty="0">
+                  <a:latin typeface="Helvetica" pitchFamily="2" charset="0"/>
+                </a:rPr>
+                <a:t>Collection</a:t>
+              </a:r>
+            </a:p>
+          </p:txBody>
+        </p:sp>
+      </p:grpSp>
+      <p:sp>
+        <p:nvSpPr>
+          <p:cNvPr id="2" name="Rectangle 1">
+            <a:extLst>
+              <a:ext uri="{FF2B5EF4-FFF2-40B4-BE49-F238E27FC236}">
+                <a16:creationId xmlns:a16="http://schemas.microsoft.com/office/drawing/2014/main" id="{73A50F9E-9866-3D0B-AECA-E67B93A51B5D}"/>
+              </a:ext>
+            </a:extLst>
+          </p:cNvPr>
+          <p:cNvSpPr/>
+          <p:nvPr/>
+        </p:nvSpPr>
+        <p:spPr>
+          <a:xfrm>
+            <a:off x="1828139" y="1172213"/>
+            <a:ext cx="4937760" cy="4251960"/>
+          </a:xfrm>
+          <a:prstGeom prst="rect">
+            <a:avLst/>
+          </a:prstGeom>
+          <a:noFill/>
+        </p:spPr>
+        <p:style>
+          <a:lnRef idx="2">
+            <a:schemeClr val="accent1">
+              <a:shade val="15000"/>
+            </a:schemeClr>
+          </a:lnRef>
+          <a:fillRef idx="1">
+            <a:schemeClr val="accent1"/>
+          </a:fillRef>
+          <a:effectRef idx="0">
+            <a:schemeClr val="accent1"/>
+          </a:effectRef>
+          <a:fontRef idx="minor">
+            <a:schemeClr val="lt1"/>
+          </a:fontRef>
+        </p:style>
+        <p:txBody>
+          <a:bodyPr rtlCol="0" anchor="ctr"/>
+          <a:lstStyle/>
+          <a:p>
+            <a:pPr algn="ctr"/>
+            <a:endParaRPr lang="en-US" sz="1350"/>
+          </a:p>
+        </p:txBody>
+      </p:sp>
+    </p:spTree>
+    <p:extLst>
+      <p:ext uri="{BB962C8B-B14F-4D97-AF65-F5344CB8AC3E}">
+        <p14:creationId xmlns:p14="http://schemas.microsoft.com/office/powerpoint/2010/main" val="4282376047"/>
+      </p:ext>
+    </p:extLst>
+  </p:cSld>
+  <p:clrMapOvr>
+    <a:masterClrMapping/>
+  </p:clrMapOvr>
+</p:sld>
+</file>
+
+<file path=ppt/slides/slide7.xml><?xml version="1.0" encoding="utf-8"?>
+<p:sld xmlns:a="http://schemas.openxmlformats.org/drawingml/2006/main" xmlns:r="http://schemas.openxmlformats.org/officeDocument/2006/relationships" xmlns:p="http://schemas.openxmlformats.org/presentationml/2006/main">
+  <p:cSld>
+    <p:spTree>
+      <p:nvGrpSpPr>
+        <p:cNvPr id="1" name="">
+          <a:extLst>
+            <a:ext uri="{FF2B5EF4-FFF2-40B4-BE49-F238E27FC236}">
+              <a16:creationId xmlns:a16="http://schemas.microsoft.com/office/drawing/2014/main" id="{174B91D6-BF92-144D-B110-61A134E381A0}"/>
+            </a:ext>
+          </a:extLst>
+        </p:cNvPr>
+        <p:cNvGrpSpPr/>
+        <p:nvPr/>
+      </p:nvGrpSpPr>
+      <p:grpSpPr>
+        <a:xfrm>
+          <a:off x="0" y="0"/>
+          <a:ext cx="0" cy="0"/>
+          <a:chOff x="0" y="0"/>
+          <a:chExt cx="0" cy="0"/>
+        </a:xfrm>
+      </p:grpSpPr>
+      <p:graphicFrame>
+        <p:nvGraphicFramePr>
+          <p:cNvPr id="23" name="Object 22" hidden="1">
+            <a:extLst>
+              <a:ext uri="{FF2B5EF4-FFF2-40B4-BE49-F238E27FC236}">
+                <a16:creationId xmlns:a16="http://schemas.microsoft.com/office/drawing/2014/main" id="{1570CBBA-FFE2-5175-00FA-EE13F1D9E5CA}"/>
+              </a:ext>
+            </a:extLst>
+          </p:cNvPr>
+          <p:cNvGraphicFramePr>
+            <a:graphicFrameLocks noChangeAspect="1"/>
+          </p:cNvGraphicFramePr>
+          <p:nvPr>
+            <p:custDataLst>
+              <p:tags r:id="rId1"/>
+            </p:custDataLst>
+          </p:nvPr>
+        </p:nvGraphicFramePr>
+        <p:xfrm>
+          <a:off x="1192" y="858441"/>
+          <a:ext cx="920" cy="1191"/>
+        </p:xfrm>
+        <a:graphic>
+          <a:graphicData uri="http://schemas.openxmlformats.org/presentationml/2006/ole">
+            <mc:AlternateContent xmlns:mc="http://schemas.openxmlformats.org/markup-compatibility/2006">
+              <mc:Choice xmlns:v="urn:schemas-microsoft-com:vml" Requires="v">
+                <p:oleObj name="think-cell Slide" r:id="rId3" imgW="7772400" imgH="10058400" progId="TCLayout.ActiveDocument.1">
+                  <p:embed/>
+                </p:oleObj>
+              </mc:Choice>
+              <mc:Fallback>
+                <p:oleObj name="think-cell Slide" r:id="rId3" imgW="7772400" imgH="10058400" progId="TCLayout.ActiveDocument.1">
+                  <p:embed/>
+                  <p:pic>
+                    <p:nvPicPr>
+                      <p:cNvPr id="23" name="Object 22" hidden="1">
+                        <a:extLst>
+                          <a:ext uri="{FF2B5EF4-FFF2-40B4-BE49-F238E27FC236}">
+                            <a16:creationId xmlns:a16="http://schemas.microsoft.com/office/drawing/2014/main" id="{1570CBBA-FFE2-5175-00FA-EE13F1D9E5CA}"/>
+                          </a:ext>
+                        </a:extLst>
+                      </p:cNvPr>
+                      <p:cNvPicPr/>
+                      <p:nvPr/>
+                    </p:nvPicPr>
+                    <p:blipFill>
+                      <a:blip r:embed="rId4"/>
+                      <a:stretch>
+                        <a:fillRect/>
+                      </a:stretch>
+                    </p:blipFill>
+                    <p:spPr>
+                      <a:xfrm>
+                        <a:off x="1192" y="858441"/>
+                        <a:ext cx="920" cy="1191"/>
+                      </a:xfrm>
+                      <a:prstGeom prst="rect">
+                        <a:avLst/>
+                      </a:prstGeom>
+                    </p:spPr>
+                  </p:pic>
+                </p:oleObj>
+              </mc:Fallback>
+            </mc:AlternateContent>
+          </a:graphicData>
+        </a:graphic>
+      </p:graphicFrame>
+      <p:grpSp>
+        <p:nvGrpSpPr>
+          <p:cNvPr id="4" name="Group 3">
+            <a:extLst>
+              <a:ext uri="{FF2B5EF4-FFF2-40B4-BE49-F238E27FC236}">
+                <a16:creationId xmlns:a16="http://schemas.microsoft.com/office/drawing/2014/main" id="{3EA70F6F-E481-EFB1-5303-C17B69A98CCC}"/>
+              </a:ext>
+            </a:extLst>
+          </p:cNvPr>
+          <p:cNvGrpSpPr/>
+          <p:nvPr/>
+        </p:nvGrpSpPr>
+        <p:grpSpPr>
+          <a:xfrm>
+            <a:off x="2411542" y="1552053"/>
+            <a:ext cx="3510379" cy="3482202"/>
+            <a:chOff x="2801815" y="1272151"/>
+            <a:chExt cx="3633129" cy="3960553"/>
+          </a:xfrm>
+        </p:grpSpPr>
+        <p:sp>
+          <p:nvSpPr>
+            <p:cNvPr id="5" name="TextBox 4">
+              <a:extLst>
+                <a:ext uri="{FF2B5EF4-FFF2-40B4-BE49-F238E27FC236}">
+                  <a16:creationId xmlns:a16="http://schemas.microsoft.com/office/drawing/2014/main" id="{33E56C78-49DE-024A-C2EA-9150794040F7}"/>
+                </a:ext>
+              </a:extLst>
+            </p:cNvPr>
+            <p:cNvSpPr txBox="1"/>
+            <p:nvPr/>
+          </p:nvSpPr>
+          <p:spPr>
+            <a:xfrm>
+              <a:off x="4419753" y="1272151"/>
+              <a:ext cx="722021" cy="315050"/>
+            </a:xfrm>
+            <a:prstGeom prst="rect">
+              <a:avLst/>
+            </a:prstGeom>
+            <a:noFill/>
+          </p:spPr>
+          <p:txBody>
+            <a:bodyPr wrap="none" rtlCol="0">
+              <a:spAutoFit/>
+            </a:bodyPr>
+            <a:lstStyle/>
+            <a:p>
+              <a:r>
+                <a:rPr lang="en-US" sz="1200" b="1" dirty="0">
+                  <a:latin typeface="Helvetica" pitchFamily="2" charset="0"/>
+                </a:rPr>
+                <a:t>Theory</a:t>
+              </a:r>
+            </a:p>
+          </p:txBody>
+        </p:sp>
+        <p:sp>
+          <p:nvSpPr>
+            <p:cNvPr id="6" name="TextBox 5">
+              <a:extLst>
+                <a:ext uri="{FF2B5EF4-FFF2-40B4-BE49-F238E27FC236}">
+                  <a16:creationId xmlns:a16="http://schemas.microsoft.com/office/drawing/2014/main" id="{CE0C9E84-754C-F44C-F031-B96FD5272E25}"/>
+                </a:ext>
+              </a:extLst>
+            </p:cNvPr>
+            <p:cNvSpPr txBox="1"/>
+            <p:nvPr/>
+          </p:nvSpPr>
+          <p:spPr>
+            <a:xfrm>
+              <a:off x="2801815" y="3141787"/>
+              <a:ext cx="740271" cy="315050"/>
+            </a:xfrm>
+            <a:prstGeom prst="rect">
+              <a:avLst/>
+            </a:prstGeom>
+            <a:noFill/>
+          </p:spPr>
+          <p:txBody>
+            <a:bodyPr wrap="none" rtlCol="0">
+              <a:spAutoFit/>
+            </a:bodyPr>
+            <a:lstStyle/>
+            <a:p>
+              <a:r>
+                <a:rPr lang="en-US" sz="1200" b="1" dirty="0">
+                  <a:latin typeface="Helvetica" pitchFamily="2" charset="0"/>
+                </a:rPr>
+                <a:t>Models</a:t>
+              </a:r>
+            </a:p>
+          </p:txBody>
+        </p:sp>
+        <p:sp>
+          <p:nvSpPr>
+            <p:cNvPr id="7" name="TextBox 6">
+              <a:extLst>
+                <a:ext uri="{FF2B5EF4-FFF2-40B4-BE49-F238E27FC236}">
+                  <a16:creationId xmlns:a16="http://schemas.microsoft.com/office/drawing/2014/main" id="{C9E23804-CA39-0D2B-2219-2FCB9F81F542}"/>
+                </a:ext>
+              </a:extLst>
+            </p:cNvPr>
+            <p:cNvSpPr txBox="1"/>
+            <p:nvPr/>
+          </p:nvSpPr>
+          <p:spPr>
+            <a:xfrm>
+              <a:off x="5900396" y="3141787"/>
+              <a:ext cx="534548" cy="315050"/>
+            </a:xfrm>
+            <a:prstGeom prst="rect">
+              <a:avLst/>
+            </a:prstGeom>
+            <a:noFill/>
+          </p:spPr>
+          <p:txBody>
+            <a:bodyPr wrap="none" rtlCol="0">
+              <a:spAutoFit/>
+            </a:bodyPr>
+            <a:lstStyle/>
+            <a:p>
+              <a:r>
+                <a:rPr lang="en-US" sz="1200" b="1" dirty="0">
+                  <a:latin typeface="Helvetica" pitchFamily="2" charset="0"/>
+                </a:rPr>
+                <a:t>Data</a:t>
+              </a:r>
+            </a:p>
+          </p:txBody>
+        </p:sp>
+        <p:cxnSp>
+          <p:nvCxnSpPr>
+            <p:cNvPr id="10" name="Straight Arrow Connector 9">
+              <a:extLst>
+                <a:ext uri="{FF2B5EF4-FFF2-40B4-BE49-F238E27FC236}">
+                  <a16:creationId xmlns:a16="http://schemas.microsoft.com/office/drawing/2014/main" id="{79DD6BF3-F009-B57F-0C6B-731BD2291812}"/>
+                </a:ext>
+              </a:extLst>
+            </p:cNvPr>
+            <p:cNvCxnSpPr>
+              <a:cxnSpLocks/>
+            </p:cNvCxnSpPr>
+            <p:nvPr/>
+          </p:nvCxnSpPr>
+          <p:spPr>
+            <a:xfrm flipH="1">
+              <a:off x="3749539" y="3341601"/>
+              <a:ext cx="1891641" cy="0"/>
+            </a:xfrm>
+            <a:prstGeom prst="straightConnector1">
+              <a:avLst/>
+            </a:prstGeom>
+            <a:ln w="38100">
+              <a:tailEnd type="triangle"/>
+            </a:ln>
+          </p:spPr>
+          <p:style>
+            <a:lnRef idx="1">
+              <a:schemeClr val="accent1"/>
+            </a:lnRef>
+            <a:fillRef idx="0">
+              <a:schemeClr val="accent1"/>
+            </a:fillRef>
+            <a:effectRef idx="0">
+              <a:schemeClr val="accent1"/>
+            </a:effectRef>
+            <a:fontRef idx="minor">
+              <a:schemeClr val="tx1"/>
+            </a:fontRef>
+          </p:style>
+        </p:cxnSp>
+        <p:cxnSp>
+          <p:nvCxnSpPr>
+            <p:cNvPr id="12" name="Straight Arrow Connector 11">
+              <a:extLst>
+                <a:ext uri="{FF2B5EF4-FFF2-40B4-BE49-F238E27FC236}">
+                  <a16:creationId xmlns:a16="http://schemas.microsoft.com/office/drawing/2014/main" id="{989FC92A-544D-95F5-B02F-E4164BFFA197}"/>
+                </a:ext>
+              </a:extLst>
+            </p:cNvPr>
+            <p:cNvCxnSpPr>
+              <a:cxnSpLocks/>
+            </p:cNvCxnSpPr>
+            <p:nvPr/>
+          </p:nvCxnSpPr>
+          <p:spPr>
+            <a:xfrm flipV="1">
+              <a:off x="3505351" y="1711683"/>
+              <a:ext cx="1006739" cy="1395715"/>
+            </a:xfrm>
+            <a:prstGeom prst="straightConnector1">
+              <a:avLst/>
+            </a:prstGeom>
+            <a:ln w="12700">
+              <a:tailEnd type="triangle"/>
+            </a:ln>
+          </p:spPr>
+          <p:style>
+            <a:lnRef idx="1">
+              <a:schemeClr val="accent1"/>
+            </a:lnRef>
+            <a:fillRef idx="0">
+              <a:schemeClr val="accent1"/>
+            </a:fillRef>
+            <a:effectRef idx="0">
+              <a:schemeClr val="accent1"/>
+            </a:effectRef>
+            <a:fontRef idx="minor">
+              <a:schemeClr val="tx1"/>
+            </a:fontRef>
+          </p:style>
+        </p:cxnSp>
+        <p:sp>
+          <p:nvSpPr>
+            <p:cNvPr id="13" name="TextBox 12">
+              <a:extLst>
+                <a:ext uri="{FF2B5EF4-FFF2-40B4-BE49-F238E27FC236}">
+                  <a16:creationId xmlns:a16="http://schemas.microsoft.com/office/drawing/2014/main" id="{A9D07AC4-5E12-06E0-613F-9638CFD9F85B}"/>
+                </a:ext>
+              </a:extLst>
+            </p:cNvPr>
+            <p:cNvSpPr txBox="1"/>
+            <p:nvPr/>
+          </p:nvSpPr>
+          <p:spPr>
+            <a:xfrm>
+              <a:off x="4393284" y="3330714"/>
+              <a:ext cx="813270" cy="288796"/>
+            </a:xfrm>
+            <a:prstGeom prst="rect">
+              <a:avLst/>
+            </a:prstGeom>
+            <a:noFill/>
+          </p:spPr>
+          <p:txBody>
+            <a:bodyPr wrap="none" rtlCol="0">
+              <a:spAutoFit/>
+            </a:bodyPr>
+            <a:lstStyle/>
+            <a:p>
+              <a:r>
+                <a:rPr lang="en-US" sz="1050" dirty="0">
+                  <a:latin typeface="Helvetica" pitchFamily="2" charset="0"/>
+                </a:rPr>
+                <a:t>Abduction</a:t>
+              </a:r>
+            </a:p>
+          </p:txBody>
+        </p:sp>
+        <p:sp>
+          <p:nvSpPr>
+            <p:cNvPr id="15" name="TextBox 14">
+              <a:extLst>
+                <a:ext uri="{FF2B5EF4-FFF2-40B4-BE49-F238E27FC236}">
+                  <a16:creationId xmlns:a16="http://schemas.microsoft.com/office/drawing/2014/main" id="{57C091EA-E825-F20D-585B-44960B58A181}"/>
+                </a:ext>
+              </a:extLst>
+            </p:cNvPr>
+            <p:cNvSpPr txBox="1"/>
+            <p:nvPr/>
+          </p:nvSpPr>
+          <p:spPr>
+            <a:xfrm>
+              <a:off x="4127080" y="2205671"/>
+              <a:ext cx="758521" cy="288796"/>
+            </a:xfrm>
+            <a:prstGeom prst="rect">
+              <a:avLst/>
+            </a:prstGeom>
+            <a:noFill/>
+          </p:spPr>
+          <p:txBody>
+            <a:bodyPr wrap="none" rtlCol="0">
+              <a:spAutoFit/>
+            </a:bodyPr>
+            <a:lstStyle/>
+            <a:p>
+              <a:r>
+                <a:rPr lang="en-US" sz="1050" dirty="0">
+                  <a:latin typeface="Helvetica" pitchFamily="2" charset="0"/>
+                </a:rPr>
+                <a:t>Induction</a:t>
+              </a:r>
+            </a:p>
+          </p:txBody>
+        </p:sp>
+        <p:sp>
+          <p:nvSpPr>
+            <p:cNvPr id="17" name="TextBox 16">
+              <a:extLst>
+                <a:ext uri="{FF2B5EF4-FFF2-40B4-BE49-F238E27FC236}">
+                  <a16:creationId xmlns:a16="http://schemas.microsoft.com/office/drawing/2014/main" id="{BBEC1831-11C8-4874-2354-A09B8C72F148}"/>
+                </a:ext>
+              </a:extLst>
+            </p:cNvPr>
+            <p:cNvSpPr txBox="1"/>
+            <p:nvPr/>
+          </p:nvSpPr>
+          <p:spPr>
+            <a:xfrm>
+              <a:off x="4178235" y="4917654"/>
+              <a:ext cx="1201489" cy="315050"/>
+            </a:xfrm>
+            <a:prstGeom prst="rect">
+              <a:avLst/>
+            </a:prstGeom>
+            <a:noFill/>
+          </p:spPr>
+          <p:txBody>
+            <a:bodyPr wrap="none" rtlCol="0">
+              <a:spAutoFit/>
+            </a:bodyPr>
+            <a:lstStyle/>
+            <a:p>
+              <a:r>
+                <a:rPr lang="en-US" sz="1200" b="1" dirty="0">
+                  <a:latin typeface="Helvetica" pitchFamily="2" charset="0"/>
+                </a:rPr>
+                <a:t>Phenomenon</a:t>
+              </a:r>
+            </a:p>
+          </p:txBody>
+        </p:sp>
+        <p:cxnSp>
+          <p:nvCxnSpPr>
+            <p:cNvPr id="21" name="Straight Arrow Connector 20">
+              <a:extLst>
+                <a:ext uri="{FF2B5EF4-FFF2-40B4-BE49-F238E27FC236}">
+                  <a16:creationId xmlns:a16="http://schemas.microsoft.com/office/drawing/2014/main" id="{56EB3402-E926-3DD7-221C-19D653BAA311}"/>
+                </a:ext>
+              </a:extLst>
+            </p:cNvPr>
+            <p:cNvCxnSpPr>
+              <a:cxnSpLocks/>
+            </p:cNvCxnSpPr>
+            <p:nvPr/>
+          </p:nvCxnSpPr>
+          <p:spPr>
+            <a:xfrm>
+              <a:off x="3433107" y="3553045"/>
+              <a:ext cx="803927" cy="1207965"/>
+            </a:xfrm>
+            <a:prstGeom prst="straightConnector1">
+              <a:avLst/>
+            </a:prstGeom>
+            <a:ln w="12700">
+              <a:solidFill>
+                <a:schemeClr val="accent1"/>
+              </a:solidFill>
+              <a:prstDash val="dash"/>
+              <a:tailEnd type="triangle"/>
+            </a:ln>
+          </p:spPr>
+          <p:style>
+            <a:lnRef idx="1">
+              <a:schemeClr val="accent1"/>
+            </a:lnRef>
+            <a:fillRef idx="0">
+              <a:schemeClr val="accent1"/>
+            </a:fillRef>
+            <a:effectRef idx="0">
+              <a:schemeClr val="accent1"/>
+            </a:effectRef>
+            <a:fontRef idx="minor">
+              <a:schemeClr val="tx1"/>
+            </a:fontRef>
+          </p:style>
+        </p:cxnSp>
+        <p:sp>
+          <p:nvSpPr>
+            <p:cNvPr id="22" name="TextBox 21">
+              <a:extLst>
+                <a:ext uri="{FF2B5EF4-FFF2-40B4-BE49-F238E27FC236}">
+                  <a16:creationId xmlns:a16="http://schemas.microsoft.com/office/drawing/2014/main" id="{50A43FCF-779D-BE4F-C043-26857F8345DD}"/>
+                </a:ext>
+              </a:extLst>
+            </p:cNvPr>
+            <p:cNvSpPr txBox="1"/>
+            <p:nvPr/>
+          </p:nvSpPr>
+          <p:spPr>
+            <a:xfrm>
+              <a:off x="3887587" y="4024466"/>
+              <a:ext cx="1301327" cy="288797"/>
+            </a:xfrm>
+            <a:prstGeom prst="rect">
+              <a:avLst/>
+            </a:prstGeom>
+            <a:noFill/>
+          </p:spPr>
+          <p:txBody>
+            <a:bodyPr wrap="square" rtlCol="0">
+              <a:spAutoFit/>
+            </a:bodyPr>
+            <a:lstStyle/>
+            <a:p>
+              <a:r>
+                <a:rPr lang="en-US" sz="1050" dirty="0">
+                  <a:latin typeface="Helvetica" pitchFamily="2" charset="0"/>
+                </a:rPr>
+                <a:t>Explanation</a:t>
+              </a:r>
+            </a:p>
+          </p:txBody>
+        </p:sp>
+      </p:grpSp>
+      <p:sp>
+        <p:nvSpPr>
+          <p:cNvPr id="2" name="Rectangle 1">
+            <a:extLst>
+              <a:ext uri="{FF2B5EF4-FFF2-40B4-BE49-F238E27FC236}">
+                <a16:creationId xmlns:a16="http://schemas.microsoft.com/office/drawing/2014/main" id="{8A813BA3-0A7F-9287-B231-7F598C4888E4}"/>
+              </a:ext>
+            </a:extLst>
+          </p:cNvPr>
+          <p:cNvSpPr/>
+          <p:nvPr/>
+        </p:nvSpPr>
+        <p:spPr>
+          <a:xfrm>
+            <a:off x="1828139" y="1172213"/>
+            <a:ext cx="4937760" cy="4251960"/>
+          </a:xfrm>
+          <a:prstGeom prst="rect">
+            <a:avLst/>
+          </a:prstGeom>
+          <a:noFill/>
+        </p:spPr>
+        <p:style>
+          <a:lnRef idx="2">
+            <a:schemeClr val="accent1">
+              <a:shade val="15000"/>
+            </a:schemeClr>
+          </a:lnRef>
+          <a:fillRef idx="1">
+            <a:schemeClr val="accent1"/>
+          </a:fillRef>
+          <a:effectRef idx="0">
+            <a:schemeClr val="accent1"/>
+          </a:effectRef>
+          <a:fontRef idx="minor">
+            <a:schemeClr val="lt1"/>
+          </a:fontRef>
+        </p:style>
+        <p:txBody>
+          <a:bodyPr rtlCol="0" anchor="ctr"/>
+          <a:lstStyle/>
+          <a:p>
+            <a:pPr algn="ctr"/>
+            <a:endParaRPr lang="en-US" sz="1350"/>
+          </a:p>
+        </p:txBody>
+      </p:sp>
+    </p:spTree>
+    <p:extLst>
+      <p:ext uri="{BB962C8B-B14F-4D97-AF65-F5344CB8AC3E}">
+        <p14:creationId xmlns:p14="http://schemas.microsoft.com/office/powerpoint/2010/main" val="2034433202"/>
+      </p:ext>
+    </p:extLst>
+  </p:cSld>
+  <p:clrMapOvr>
+    <a:masterClrMapping/>
+  </p:clrMapOvr>
+</p:sld>
+</file>
+
 <file path=ppt/tags/tag1.xml><?xml version="1.0" encoding="utf-8"?>
 <p:tagLst xmlns:a="http://schemas.openxmlformats.org/drawingml/2006/main" xmlns:r="http://schemas.openxmlformats.org/officeDocument/2006/relationships" xmlns:p="http://schemas.openxmlformats.org/presentationml/2006/main">
   <p:tag name="TPVERSION" val="2008"/>
@@ -5823,6 +8423,30 @@
 <file path=ppt/tags/tag10.xml><?xml version="1.0" encoding="utf-8"?>
 <p:tagLst xmlns:a="http://schemas.openxmlformats.org/drawingml/2006/main" xmlns:r="http://schemas.openxmlformats.org/officeDocument/2006/relationships" xmlns:p="http://schemas.openxmlformats.org/presentationml/2006/main">
   <p:tag name="THINKCELLSHAPEDONOTDELETE" val="tu957VsHTENLD_X6HLEgpxw"/>
+</p:tagLst>
+</file>
+
+<file path=ppt/tags/tag11.xml><?xml version="1.0" encoding="utf-8"?>
+<p:tagLst xmlns:a="http://schemas.openxmlformats.org/drawingml/2006/main" xmlns:r="http://schemas.openxmlformats.org/officeDocument/2006/relationships" xmlns:p="http://schemas.openxmlformats.org/presentationml/2006/main">
+  <p:tag name="THINKCELLSHAPEDONOTDELETE" val="thinkcellActiveDocDoNotDelete"/>
+</p:tagLst>
+</file>
+
+<file path=ppt/tags/tag12.xml><?xml version="1.0" encoding="utf-8"?>
+<p:tagLst xmlns:a="http://schemas.openxmlformats.org/drawingml/2006/main" xmlns:r="http://schemas.openxmlformats.org/officeDocument/2006/relationships" xmlns:p="http://schemas.openxmlformats.org/presentationml/2006/main">
+  <p:tag name="THINKCELLSHAPEDONOTDELETE" val="thinkcellActiveDocDoNotDelete"/>
+</p:tagLst>
+</file>
+
+<file path=ppt/tags/tag13.xml><?xml version="1.0" encoding="utf-8"?>
+<p:tagLst xmlns:a="http://schemas.openxmlformats.org/drawingml/2006/main" xmlns:r="http://schemas.openxmlformats.org/officeDocument/2006/relationships" xmlns:p="http://schemas.openxmlformats.org/presentationml/2006/main">
+  <p:tag name="THINKCELLSHAPEDONOTDELETE" val="thinkcellActiveDocDoNotDelete"/>
+</p:tagLst>
+</file>
+
+<file path=ppt/tags/tag14.xml><?xml version="1.0" encoding="utf-8"?>
+<p:tagLst xmlns:a="http://schemas.openxmlformats.org/drawingml/2006/main" xmlns:r="http://schemas.openxmlformats.org/officeDocument/2006/relationships" xmlns:p="http://schemas.openxmlformats.org/presentationml/2006/main">
+  <p:tag name="THINKCELLSHAPEDONOTDELETE" val="thinkcellActiveDocDoNotDelete"/>
 </p:tagLst>
 </file>
 

</xml_diff>